<commit_message>
translation url style v3.0--> v2.5 deprecated
</commit_message>
<xml_diff>
--- a/_site/translations/en-us/advanced/GyroRevisited.pptx
+++ b/_site/translations/en-us/advanced/GyroRevisited.pptx
@@ -5,10 +5,10 @@
     <p:sldMasterId id="2147483835" r:id="rId1"/>
   </p:sldMasterIdLst>
   <p:notesMasterIdLst>
-    <p:notesMasterId r:id="rId16"/>
+    <p:notesMasterId r:id="rId17"/>
   </p:notesMasterIdLst>
   <p:handoutMasterIdLst>
-    <p:handoutMasterId r:id="rId17"/>
+    <p:handoutMasterId r:id="rId18"/>
   </p:handoutMasterIdLst>
   <p:sldIdLst>
     <p:sldId id="258" r:id="rId2"/>
@@ -18,13 +18,14 @@
     <p:sldId id="292" r:id="rId6"/>
     <p:sldId id="293" r:id="rId7"/>
     <p:sldId id="296" r:id="rId8"/>
-    <p:sldId id="295" r:id="rId9"/>
-    <p:sldId id="294" r:id="rId10"/>
-    <p:sldId id="297" r:id="rId11"/>
-    <p:sldId id="298" r:id="rId12"/>
-    <p:sldId id="299" r:id="rId13"/>
-    <p:sldId id="300" r:id="rId14"/>
-    <p:sldId id="274" r:id="rId15"/>
+    <p:sldId id="302" r:id="rId9"/>
+    <p:sldId id="295" r:id="rId10"/>
+    <p:sldId id="294" r:id="rId11"/>
+    <p:sldId id="297" r:id="rId12"/>
+    <p:sldId id="298" r:id="rId13"/>
+    <p:sldId id="299" r:id="rId14"/>
+    <p:sldId id="300" r:id="rId15"/>
+    <p:sldId id="274" r:id="rId16"/>
   </p:sldIdLst>
   <p:sldSz cx="9144000" cy="6858000" type="screen4x3"/>
   <p:notesSz cx="6858000" cy="9144000"/>
@@ -224,7 +225,7 @@
           <a:p>
             <a:fld id="{E354B44E-40A3-0E46-B16A-9BF1250A248B}" type="datetimeFigureOut">
               <a:rPr lang="en-US" smtClean="0"/>
-              <a:t>8/5/17</a:t>
+              <a:t>8/7/17</a:t>
             </a:fld>
             <a:endParaRPr lang="en-US"/>
           </a:p>
@@ -390,7 +391,7 @@
           <a:p>
             <a:fld id="{C86AD16C-2DB4-6642-BAD4-9ED973A087A0}" type="datetimeFigureOut">
               <a:rPr lang="en-US" smtClean="0"/>
-              <a:t>8/5/17</a:t>
+              <a:t>8/7/17</a:t>
             </a:fld>
             <a:endParaRPr lang="en-US"/>
           </a:p>
@@ -892,7 +893,7 @@
           <a:p>
             <a:fld id="{1E5BF589-3978-3C45-966B-D7B7A71F2A02}" type="slidenum">
               <a:rPr lang="en-US" smtClean="0"/>
-              <a:t>5</a:t>
+              <a:t>4</a:t>
             </a:fld>
             <a:endParaRPr lang="en-US"/>
           </a:p>
@@ -901,7 +902,7 @@
     </p:spTree>
     <p:extLst>
       <p:ext uri="{BB962C8B-B14F-4D97-AF65-F5344CB8AC3E}">
-        <p14:creationId xmlns:p14="http://schemas.microsoft.com/office/powerpoint/2010/main" val="1736877165"/>
+        <p14:creationId xmlns:p14="http://schemas.microsoft.com/office/powerpoint/2010/main" val="84721783"/>
       </p:ext>
     </p:extLst>
   </p:cSld>
@@ -976,7 +977,7 @@
           <a:p>
             <a:fld id="{1E5BF589-3978-3C45-966B-D7B7A71F2A02}" type="slidenum">
               <a:rPr lang="en-US" smtClean="0"/>
-              <a:t>8</a:t>
+              <a:t>5</a:t>
             </a:fld>
             <a:endParaRPr lang="en-US"/>
           </a:p>
@@ -985,7 +986,7 @@
     </p:spTree>
     <p:extLst>
       <p:ext uri="{BB962C8B-B14F-4D97-AF65-F5344CB8AC3E}">
-        <p14:creationId xmlns:p14="http://schemas.microsoft.com/office/powerpoint/2010/main" val="203441717"/>
+        <p14:creationId xmlns:p14="http://schemas.microsoft.com/office/powerpoint/2010/main" val="1736877165"/>
       </p:ext>
     </p:extLst>
   </p:cSld>
@@ -1060,7 +1061,7 @@
           <a:p>
             <a:fld id="{1E5BF589-3978-3C45-966B-D7B7A71F2A02}" type="slidenum">
               <a:rPr lang="en-US" smtClean="0"/>
-              <a:t>10</a:t>
+              <a:t>7</a:t>
             </a:fld>
             <a:endParaRPr lang="en-US"/>
           </a:p>
@@ -1069,7 +1070,7 @@
     </p:spTree>
     <p:extLst>
       <p:ext uri="{BB962C8B-B14F-4D97-AF65-F5344CB8AC3E}">
-        <p14:creationId xmlns:p14="http://schemas.microsoft.com/office/powerpoint/2010/main" val="736672855"/>
+        <p14:creationId xmlns:p14="http://schemas.microsoft.com/office/powerpoint/2010/main" val="299194441"/>
       </p:ext>
     </p:extLst>
   </p:cSld>
@@ -1123,10 +1124,94 @@
           <a:bodyPr/>
           <a:lstStyle/>
           <a:p>
+            <a:endParaRPr lang="en-US" dirty="0"/>
+          </a:p>
+        </p:txBody>
+      </p:sp>
+      <p:sp>
+        <p:nvSpPr>
+          <p:cNvPr id="4" name="Slide Number Placeholder 3"/>
+          <p:cNvSpPr>
+            <a:spLocks noGrp="1"/>
+          </p:cNvSpPr>
+          <p:nvPr>
+            <p:ph type="sldNum" sz="quarter" idx="10"/>
+          </p:nvPr>
+        </p:nvSpPr>
+        <p:spPr/>
+        <p:txBody>
+          <a:bodyPr/>
+          <a:lstStyle/>
+          <a:p>
+            <a:fld id="{1E5BF589-3978-3C45-966B-D7B7A71F2A02}" type="slidenum">
+              <a:rPr lang="en-US" smtClean="0"/>
+              <a:t>8</a:t>
+            </a:fld>
             <a:endParaRPr lang="en-US"/>
           </a:p>
         </p:txBody>
       </p:sp>
+    </p:spTree>
+    <p:extLst>
+      <p:ext uri="{BB962C8B-B14F-4D97-AF65-F5344CB8AC3E}">
+        <p14:creationId xmlns:p14="http://schemas.microsoft.com/office/powerpoint/2010/main" val="834175237"/>
+      </p:ext>
+    </p:extLst>
+  </p:cSld>
+  <p:clrMapOvr>
+    <a:masterClrMapping/>
+  </p:clrMapOvr>
+</p:notes>
+</file>
+
+<file path=ppt/notesSlides/notesSlide7.xml><?xml version="1.0" encoding="utf-8"?>
+<p:notes xmlns:a="http://schemas.openxmlformats.org/drawingml/2006/main" xmlns:r="http://schemas.openxmlformats.org/officeDocument/2006/relationships" xmlns:p="http://schemas.openxmlformats.org/presentationml/2006/main">
+  <p:cSld>
+    <p:spTree>
+      <p:nvGrpSpPr>
+        <p:cNvPr id="1" name=""/>
+        <p:cNvGrpSpPr/>
+        <p:nvPr/>
+      </p:nvGrpSpPr>
+      <p:grpSpPr>
+        <a:xfrm>
+          <a:off x="0" y="0"/>
+          <a:ext cx="0" cy="0"/>
+          <a:chOff x="0" y="0"/>
+          <a:chExt cx="0" cy="0"/>
+        </a:xfrm>
+      </p:grpSpPr>
+      <p:sp>
+        <p:nvSpPr>
+          <p:cNvPr id="2" name="Slide Image Placeholder 1"/>
+          <p:cNvSpPr>
+            <a:spLocks noGrp="1" noRot="1" noChangeAspect="1"/>
+          </p:cNvSpPr>
+          <p:nvPr>
+            <p:ph type="sldImg"/>
+          </p:nvPr>
+        </p:nvSpPr>
+        <p:spPr/>
+      </p:sp>
+      <p:sp>
+        <p:nvSpPr>
+          <p:cNvPr id="3" name="Notes Placeholder 2"/>
+          <p:cNvSpPr>
+            <a:spLocks noGrp="1"/>
+          </p:cNvSpPr>
+          <p:nvPr>
+            <p:ph type="body" idx="1"/>
+          </p:nvPr>
+        </p:nvSpPr>
+        <p:spPr/>
+        <p:txBody>
+          <a:bodyPr/>
+          <a:lstStyle/>
+          <a:p>
+            <a:endParaRPr lang="en-US"/>
+          </a:p>
+        </p:txBody>
+      </p:sp>
       <p:sp>
         <p:nvSpPr>
           <p:cNvPr id="4" name="Slide Number Placeholder 3"/>
@@ -1144,7 +1229,175 @@
           <a:p>
             <a:fld id="{1E5BF589-3978-3C45-966B-D7B7A71F2A02}" type="slidenum">
               <a:rPr lang="en-US" smtClean="0"/>
-              <a:t>14</a:t>
+              <a:t>9</a:t>
+            </a:fld>
+            <a:endParaRPr lang="en-US"/>
+          </a:p>
+        </p:txBody>
+      </p:sp>
+    </p:spTree>
+    <p:extLst>
+      <p:ext uri="{BB962C8B-B14F-4D97-AF65-F5344CB8AC3E}">
+        <p14:creationId xmlns:p14="http://schemas.microsoft.com/office/powerpoint/2010/main" val="203441717"/>
+      </p:ext>
+    </p:extLst>
+  </p:cSld>
+  <p:clrMapOvr>
+    <a:masterClrMapping/>
+  </p:clrMapOvr>
+</p:notes>
+</file>
+
+<file path=ppt/notesSlides/notesSlide8.xml><?xml version="1.0" encoding="utf-8"?>
+<p:notes xmlns:a="http://schemas.openxmlformats.org/drawingml/2006/main" xmlns:r="http://schemas.openxmlformats.org/officeDocument/2006/relationships" xmlns:p="http://schemas.openxmlformats.org/presentationml/2006/main">
+  <p:cSld>
+    <p:spTree>
+      <p:nvGrpSpPr>
+        <p:cNvPr id="1" name=""/>
+        <p:cNvGrpSpPr/>
+        <p:nvPr/>
+      </p:nvGrpSpPr>
+      <p:grpSpPr>
+        <a:xfrm>
+          <a:off x="0" y="0"/>
+          <a:ext cx="0" cy="0"/>
+          <a:chOff x="0" y="0"/>
+          <a:chExt cx="0" cy="0"/>
+        </a:xfrm>
+      </p:grpSpPr>
+      <p:sp>
+        <p:nvSpPr>
+          <p:cNvPr id="2" name="Slide Image Placeholder 1"/>
+          <p:cNvSpPr>
+            <a:spLocks noGrp="1" noRot="1" noChangeAspect="1"/>
+          </p:cNvSpPr>
+          <p:nvPr>
+            <p:ph type="sldImg"/>
+          </p:nvPr>
+        </p:nvSpPr>
+        <p:spPr/>
+      </p:sp>
+      <p:sp>
+        <p:nvSpPr>
+          <p:cNvPr id="3" name="Notes Placeholder 2"/>
+          <p:cNvSpPr>
+            <a:spLocks noGrp="1"/>
+          </p:cNvSpPr>
+          <p:nvPr>
+            <p:ph type="body" idx="1"/>
+          </p:nvPr>
+        </p:nvSpPr>
+        <p:spPr/>
+        <p:txBody>
+          <a:bodyPr/>
+          <a:lstStyle/>
+          <a:p>
+            <a:endParaRPr lang="en-US" dirty="0"/>
+          </a:p>
+        </p:txBody>
+      </p:sp>
+      <p:sp>
+        <p:nvSpPr>
+          <p:cNvPr id="4" name="Slide Number Placeholder 3"/>
+          <p:cNvSpPr>
+            <a:spLocks noGrp="1"/>
+          </p:cNvSpPr>
+          <p:nvPr>
+            <p:ph type="sldNum" sz="quarter" idx="10"/>
+          </p:nvPr>
+        </p:nvSpPr>
+        <p:spPr/>
+        <p:txBody>
+          <a:bodyPr/>
+          <a:lstStyle/>
+          <a:p>
+            <a:fld id="{1E5BF589-3978-3C45-966B-D7B7A71F2A02}" type="slidenum">
+              <a:rPr lang="en-US" smtClean="0"/>
+              <a:t>11</a:t>
+            </a:fld>
+            <a:endParaRPr lang="en-US"/>
+          </a:p>
+        </p:txBody>
+      </p:sp>
+    </p:spTree>
+    <p:extLst>
+      <p:ext uri="{BB962C8B-B14F-4D97-AF65-F5344CB8AC3E}">
+        <p14:creationId xmlns:p14="http://schemas.microsoft.com/office/powerpoint/2010/main" val="736672855"/>
+      </p:ext>
+    </p:extLst>
+  </p:cSld>
+  <p:clrMapOvr>
+    <a:masterClrMapping/>
+  </p:clrMapOvr>
+</p:notes>
+</file>
+
+<file path=ppt/notesSlides/notesSlide9.xml><?xml version="1.0" encoding="utf-8"?>
+<p:notes xmlns:a="http://schemas.openxmlformats.org/drawingml/2006/main" xmlns:r="http://schemas.openxmlformats.org/officeDocument/2006/relationships" xmlns:p="http://schemas.openxmlformats.org/presentationml/2006/main">
+  <p:cSld>
+    <p:spTree>
+      <p:nvGrpSpPr>
+        <p:cNvPr id="1" name=""/>
+        <p:cNvGrpSpPr/>
+        <p:nvPr/>
+      </p:nvGrpSpPr>
+      <p:grpSpPr>
+        <a:xfrm>
+          <a:off x="0" y="0"/>
+          <a:ext cx="0" cy="0"/>
+          <a:chOff x="0" y="0"/>
+          <a:chExt cx="0" cy="0"/>
+        </a:xfrm>
+      </p:grpSpPr>
+      <p:sp>
+        <p:nvSpPr>
+          <p:cNvPr id="2" name="Slide Image Placeholder 1"/>
+          <p:cNvSpPr>
+            <a:spLocks noGrp="1" noRot="1" noChangeAspect="1"/>
+          </p:cNvSpPr>
+          <p:nvPr>
+            <p:ph type="sldImg"/>
+          </p:nvPr>
+        </p:nvSpPr>
+        <p:spPr/>
+      </p:sp>
+      <p:sp>
+        <p:nvSpPr>
+          <p:cNvPr id="3" name="Notes Placeholder 2"/>
+          <p:cNvSpPr>
+            <a:spLocks noGrp="1"/>
+          </p:cNvSpPr>
+          <p:nvPr>
+            <p:ph type="body" idx="1"/>
+          </p:nvPr>
+        </p:nvSpPr>
+        <p:spPr/>
+        <p:txBody>
+          <a:bodyPr/>
+          <a:lstStyle/>
+          <a:p>
+            <a:endParaRPr lang="en-US"/>
+          </a:p>
+        </p:txBody>
+      </p:sp>
+      <p:sp>
+        <p:nvSpPr>
+          <p:cNvPr id="4" name="Slide Number Placeholder 3"/>
+          <p:cNvSpPr>
+            <a:spLocks noGrp="1"/>
+          </p:cNvSpPr>
+          <p:nvPr>
+            <p:ph type="sldNum" sz="quarter" idx="10"/>
+          </p:nvPr>
+        </p:nvSpPr>
+        <p:spPr/>
+        <p:txBody>
+          <a:bodyPr/>
+          <a:lstStyle/>
+          <a:p>
+            <a:fld id="{1E5BF589-3978-3C45-966B-D7B7A71F2A02}" type="slidenum">
+              <a:rPr lang="en-US" smtClean="0"/>
+              <a:t>15</a:t>
             </a:fld>
             <a:endParaRPr lang="en-US"/>
           </a:p>
@@ -1195,9 +1448,9 @@
           <a:bodyPr/>
           <a:lstStyle/>
           <a:p>
-            <a:fld id="{E15B7001-1D35-7446-9023-5A527D7D27A6}" type="datetime1">
-              <a:rPr lang="en-US" smtClean="0"/>
-              <a:t>8/6/17</a:t>
+            <a:fld id="{3C715FA1-2947-E64F-B941-11DF17087036}" type="datetime1">
+              <a:rPr lang="en-US" smtClean="0"/>
+              <a:t>8/7/17</a:t>
             </a:fld>
             <a:endParaRPr lang="en-US"/>
           </a:p>
@@ -1220,7 +1473,7 @@
           <a:p>
             <a:r>
               <a:rPr lang="sk-SK" smtClean="0"/>
-              <a:t>© 2017 EV3Lessons.com, Last edit 8/06/2017</a:t>
+              <a:t>© 2017 EV3Lessons.com, Last edit 8/07/2017</a:t>
             </a:r>
             <a:endParaRPr lang="en-US"/>
           </a:p>
@@ -1900,9 +2153,9 @@
           <a:bodyPr/>
           <a:lstStyle/>
           <a:p>
-            <a:fld id="{D6824624-02EB-534C-990E-43AA748862CC}" type="datetime1">
-              <a:rPr lang="en-US" smtClean="0"/>
-              <a:t>8/6/17</a:t>
+            <a:fld id="{E415F796-6C42-D64E-8BB7-BC0916333837}" type="datetime1">
+              <a:rPr lang="en-US" smtClean="0"/>
+              <a:t>8/7/17</a:t>
             </a:fld>
             <a:endParaRPr lang="en-US"/>
           </a:p>
@@ -1925,7 +2178,7 @@
           <a:p>
             <a:r>
               <a:rPr lang="sk-SK" smtClean="0"/>
-              <a:t>© 2017 EV3Lessons.com, Last edit 8/06/2017</a:t>
+              <a:t>© 2017 EV3Lessons.com, Last edit 8/07/2017</a:t>
             </a:r>
             <a:endParaRPr lang="en-US"/>
           </a:p>
@@ -2363,9 +2616,9 @@
           <a:bodyPr/>
           <a:lstStyle/>
           <a:p>
-            <a:fld id="{B0B85D32-F05B-AB44-89C8-8984C6589285}" type="datetime1">
-              <a:rPr lang="en-US" smtClean="0"/>
-              <a:t>8/6/17</a:t>
+            <a:fld id="{66F5A1EE-B485-5149-80A2-61D7C3FA2D8B}" type="datetime1">
+              <a:rPr lang="en-US" smtClean="0"/>
+              <a:t>8/7/17</a:t>
             </a:fld>
             <a:endParaRPr lang="en-US" dirty="0"/>
           </a:p>
@@ -2388,7 +2641,7 @@
           <a:p>
             <a:r>
               <a:rPr lang="sk-SK" smtClean="0"/>
-              <a:t>© 2017 EV3Lessons.com, Last edit 8/06/2017</a:t>
+              <a:t>© 2017 EV3Lessons.com, Last edit 8/07/2017</a:t>
             </a:r>
             <a:endParaRPr lang="en-US" dirty="0"/>
           </a:p>
@@ -2828,9 +3081,9 @@
           <a:bodyPr/>
           <a:lstStyle/>
           <a:p>
-            <a:fld id="{5B831B04-00C1-F64C-A9C3-44C89DD75C42}" type="datetime1">
-              <a:rPr lang="en-US" smtClean="0"/>
-              <a:t>8/6/17</a:t>
+            <a:fld id="{AC7D13C8-41C1-5B4C-80DA-39BB36BABDF2}" type="datetime1">
+              <a:rPr lang="en-US" smtClean="0"/>
+              <a:t>8/7/17</a:t>
             </a:fld>
             <a:endParaRPr lang="en-US"/>
           </a:p>
@@ -3553,9 +3806,9 @@
           <a:bodyPr/>
           <a:lstStyle/>
           <a:p>
-            <a:fld id="{25B999C7-22A4-5A45-82EB-6D71D92F016D}" type="datetime1">
-              <a:rPr lang="en-US" smtClean="0"/>
-              <a:t>8/6/17</a:t>
+            <a:fld id="{837F5C3A-BC7B-F544-9E8C-BE12413ED236}" type="datetime1">
+              <a:rPr lang="en-US" smtClean="0"/>
+              <a:t>8/7/17</a:t>
             </a:fld>
             <a:endParaRPr lang="en-US"/>
           </a:p>
@@ -3578,7 +3831,7 @@
           <a:p>
             <a:r>
               <a:rPr lang="sk-SK" smtClean="0"/>
-              <a:t>© 2017 EV3Lessons.com, Last edit 8/06/2017</a:t>
+              <a:t>© 2017 EV3Lessons.com, Last edit 8/07/2017</a:t>
             </a:r>
             <a:endParaRPr lang="en-US"/>
           </a:p>
@@ -3835,9 +4088,9 @@
           <a:bodyPr/>
           <a:lstStyle/>
           <a:p>
-            <a:fld id="{C2975969-2468-8E4E-850E-E40D98FCB4ED}" type="datetime1">
-              <a:rPr lang="en-US" smtClean="0"/>
-              <a:t>8/6/17</a:t>
+            <a:fld id="{313A62CF-86A0-7E4D-A4AF-6199C4485B4D}" type="datetime1">
+              <a:rPr lang="en-US" smtClean="0"/>
+              <a:t>8/7/17</a:t>
             </a:fld>
             <a:endParaRPr lang="en-US"/>
           </a:p>
@@ -3860,7 +4113,7 @@
           <a:p>
             <a:r>
               <a:rPr lang="sk-SK" smtClean="0"/>
-              <a:t>© 2017 EV3Lessons.com, Last edit 8/06/2017</a:t>
+              <a:t>© 2017 EV3Lessons.com, Last edit 8/07/2017</a:t>
             </a:r>
             <a:endParaRPr lang="en-US"/>
           </a:p>
@@ -4155,9 +4408,9 @@
           <a:bodyPr/>
           <a:lstStyle/>
           <a:p>
-            <a:fld id="{7FFBCDD8-21E8-2C41-83D5-7C9EF872E7BC}" type="datetime1">
-              <a:rPr lang="en-US" smtClean="0"/>
-              <a:t>8/6/17</a:t>
+            <a:fld id="{56F3448C-69FA-024E-B7DF-500F5504446F}" type="datetime1">
+              <a:rPr lang="en-US" smtClean="0"/>
+              <a:t>8/7/17</a:t>
             </a:fld>
             <a:endParaRPr lang="en-US"/>
           </a:p>
@@ -4180,7 +4433,7 @@
           <a:p>
             <a:r>
               <a:rPr lang="sk-SK" smtClean="0"/>
-              <a:t>© 2017 EV3Lessons.com, Last edit 8/06/2017</a:t>
+              <a:t>© 2017 EV3Lessons.com, Last edit 8/07/2017</a:t>
             </a:r>
             <a:endParaRPr lang="en-US"/>
           </a:p>
@@ -4384,9 +4637,9 @@
           <a:bodyPr/>
           <a:lstStyle/>
           <a:p>
-            <a:fld id="{97F6E7E2-0024-BC4D-BC52-F9C27A293FF1}" type="datetime1">
-              <a:rPr lang="en-US" smtClean="0"/>
-              <a:t>8/6/17</a:t>
+            <a:fld id="{35BE2AEB-69B6-E84E-9D0D-1DC22D3DDD41}" type="datetime1">
+              <a:rPr lang="en-US" smtClean="0"/>
+              <a:t>8/7/17</a:t>
             </a:fld>
             <a:endParaRPr lang="en-US"/>
           </a:p>
@@ -4409,7 +4662,7 @@
           <a:p>
             <a:r>
               <a:rPr lang="sk-SK" smtClean="0"/>
-              <a:t>© 2017 EV3Lessons.com, Last edit 8/06/2017</a:t>
+              <a:t>© 2017 EV3Lessons.com, Last edit 8/07/2017</a:t>
             </a:r>
             <a:endParaRPr lang="en-US"/>
           </a:p>
@@ -4671,9 +4924,9 @@
           <a:bodyPr/>
           <a:lstStyle/>
           <a:p>
-            <a:fld id="{FA6ABD88-CB76-CA4F-9523-701326D114C7}" type="datetime1">
-              <a:rPr lang="en-US" smtClean="0"/>
-              <a:t>8/6/17</a:t>
+            <a:fld id="{7E9C9910-4014-7C4F-9F49-BB9F756CA6DC}" type="datetime1">
+              <a:rPr lang="en-US" smtClean="0"/>
+              <a:t>8/7/17</a:t>
             </a:fld>
             <a:endParaRPr lang="en-US" dirty="0"/>
           </a:p>
@@ -4696,7 +4949,7 @@
           <a:p>
             <a:r>
               <a:rPr lang="sk-SK" smtClean="0"/>
-              <a:t>© 2017 EV3Lessons.com, Last edit 8/06/2017</a:t>
+              <a:t>© 2017 EV3Lessons.com, Last edit 8/07/2017</a:t>
             </a:r>
             <a:endParaRPr lang="en-US" dirty="0"/>
           </a:p>
@@ -4915,9 +5168,9 @@
             </a:lvl1pPr>
           </a:lstStyle>
           <a:p>
-            <a:fld id="{EFBE4632-5206-8F4C-AEA7-B12DCD30C86F}" type="datetime1">
-              <a:rPr lang="en-US" smtClean="0"/>
-              <a:t>8/6/17</a:t>
+            <a:fld id="{936D9B0C-0FCD-EC49-BAD8-085C4162593C}" type="datetime1">
+              <a:rPr lang="en-US" smtClean="0"/>
+              <a:t>8/7/17</a:t>
             </a:fld>
             <a:endParaRPr lang="en-US" dirty="0"/>
           </a:p>
@@ -4958,7 +5211,7 @@
           <a:p>
             <a:r>
               <a:rPr lang="sk-SK" smtClean="0"/>
-              <a:t>© 2017 EV3Lessons.com, Last edit 8/06/2017</a:t>
+              <a:t>© 2017 EV3Lessons.com, Last edit 8/07/2017</a:t>
             </a:r>
             <a:endParaRPr lang="en-US" dirty="0"/>
           </a:p>
@@ -5563,14 +5816,281 @@
           <a:p>
             <a:r>
               <a:rPr lang="sk-SK" smtClean="0"/>
-              <a:t>© 2017 EV3Lessons.com, Last edit 8/06/2017</a:t>
-            </a:r>
+              <a:t>© 2017 EV3Lessons.com, Last edit 8/07/2017</a:t>
+            </a:r>
+            <a:endParaRPr lang="en-US" dirty="0"/>
+          </a:p>
+        </p:txBody>
+      </p:sp>
+      <p:sp>
+        <p:nvSpPr>
+          <p:cNvPr id="4" name="Title 3"/>
+          <p:cNvSpPr>
+            <a:spLocks noGrp="1"/>
+          </p:cNvSpPr>
+          <p:nvPr>
+            <p:ph type="title"/>
+          </p:nvPr>
+        </p:nvSpPr>
+        <p:spPr/>
+        <p:txBody>
+          <a:bodyPr/>
+          <a:lstStyle/>
+          <a:p>
+            <a:r>
+              <a:rPr lang="en-US" dirty="0" smtClean="0"/>
+              <a:t>Recalibration Strategy 5</a:t>
+            </a:r>
+            <a:endParaRPr lang="en-US" dirty="0"/>
+          </a:p>
+        </p:txBody>
+      </p:sp>
+      <p:sp>
+        <p:nvSpPr>
+          <p:cNvPr id="5" name="Slide Number Placeholder 4"/>
+          <p:cNvSpPr>
+            <a:spLocks noGrp="1"/>
+          </p:cNvSpPr>
+          <p:nvPr>
+            <p:ph type="sldNum" sz="quarter" idx="12"/>
+          </p:nvPr>
+        </p:nvSpPr>
+        <p:spPr/>
+        <p:txBody>
+          <a:bodyPr/>
+          <a:lstStyle/>
+          <a:p>
+            <a:fld id="{4382A7F7-08BF-4252-8141-63FB96055BBB}" type="slidenum">
+              <a:rPr lang="en-US" smtClean="0"/>
+              <a:t>10</a:t>
+            </a:fld>
             <a:endParaRPr lang="en-US"/>
           </a:p>
         </p:txBody>
       </p:sp>
       <p:sp>
         <p:nvSpPr>
+          <p:cNvPr id="6" name="TextBox 5"/>
+          <p:cNvSpPr txBox="1"/>
+          <p:nvPr/>
+        </p:nvSpPr>
+        <p:spPr>
+          <a:xfrm>
+            <a:off x="416027" y="1689453"/>
+            <a:ext cx="4008489" cy="923330"/>
+          </a:xfrm>
+          <a:prstGeom prst="rect">
+            <a:avLst/>
+          </a:prstGeom>
+          <a:solidFill>
+            <a:schemeClr val="accent2">
+              <a:lumMod val="60000"/>
+              <a:lumOff val="40000"/>
+            </a:schemeClr>
+          </a:solidFill>
+        </p:spPr>
+        <p:txBody>
+          <a:bodyPr wrap="square" rtlCol="0">
+            <a:spAutoFit/>
+          </a:bodyPr>
+          <a:lstStyle/>
+          <a:p>
+            <a:r>
+              <a:rPr lang="en-US" dirty="0" smtClean="0">
+                <a:solidFill>
+                  <a:srgbClr val="000000"/>
+                </a:solidFill>
+              </a:rPr>
+              <a:t>First, reading the gyro as an IR sensor and then as a gyro causes </a:t>
+            </a:r>
+            <a:r>
+              <a:rPr lang="en-US" dirty="0">
+                <a:solidFill>
+                  <a:srgbClr val="000000"/>
+                </a:solidFill>
+              </a:rPr>
+              <a:t>t</a:t>
+            </a:r>
+            <a:r>
+              <a:rPr lang="en-US" dirty="0" smtClean="0">
+                <a:solidFill>
+                  <a:srgbClr val="000000"/>
+                </a:solidFill>
+              </a:rPr>
+              <a:t>he gyro to recalibrate. </a:t>
+            </a:r>
+            <a:endParaRPr lang="en-US" dirty="0">
+              <a:solidFill>
+                <a:srgbClr val="000000"/>
+              </a:solidFill>
+            </a:endParaRPr>
+          </a:p>
+        </p:txBody>
+      </p:sp>
+      <p:sp>
+        <p:nvSpPr>
+          <p:cNvPr id="7" name="TextBox 6"/>
+          <p:cNvSpPr txBox="1"/>
+          <p:nvPr/>
+        </p:nvSpPr>
+        <p:spPr>
+          <a:xfrm>
+            <a:off x="4527755" y="1702380"/>
+            <a:ext cx="4330494" cy="1477328"/>
+          </a:xfrm>
+          <a:prstGeom prst="rect">
+            <a:avLst/>
+          </a:prstGeom>
+          <a:solidFill>
+            <a:srgbClr val="FFFF00"/>
+          </a:solidFill>
+        </p:spPr>
+        <p:txBody>
+          <a:bodyPr wrap="square" rtlCol="0">
+            <a:spAutoFit/>
+          </a:bodyPr>
+          <a:lstStyle/>
+          <a:p>
+            <a:r>
+              <a:rPr lang="en-US" dirty="0" smtClean="0"/>
+              <a:t>Second, add a wait block to give the sensor a bit of time to fully recalibrate. Our measurements show that </a:t>
+            </a:r>
+            <a:r>
+              <a:rPr lang="en-US" dirty="0"/>
+              <a:t>4</a:t>
+            </a:r>
+            <a:r>
+              <a:rPr lang="en-US" dirty="0" smtClean="0"/>
+              <a:t> seconds is safe. Note that the Strategy 1 code in Intro to Gyro, recalibration only took 0.1 seconds.</a:t>
+            </a:r>
+            <a:endParaRPr lang="en-US" dirty="0"/>
+          </a:p>
+        </p:txBody>
+      </p:sp>
+      <p:sp>
+        <p:nvSpPr>
+          <p:cNvPr id="8" name="TextBox 7"/>
+          <p:cNvSpPr txBox="1"/>
+          <p:nvPr/>
+        </p:nvSpPr>
+        <p:spPr>
+          <a:xfrm>
+            <a:off x="5884606" y="3543337"/>
+            <a:ext cx="2973643" cy="3139321"/>
+          </a:xfrm>
+          <a:prstGeom prst="rect">
+            <a:avLst/>
+          </a:prstGeom>
+          <a:solidFill>
+            <a:srgbClr val="FF0000"/>
+          </a:solidFill>
+        </p:spPr>
+        <p:txBody>
+          <a:bodyPr wrap="square" rtlCol="0">
+            <a:spAutoFit/>
+          </a:bodyPr>
+          <a:lstStyle/>
+          <a:p>
+            <a:r>
+              <a:rPr lang="en-US" dirty="0" smtClean="0">
+                <a:solidFill>
+                  <a:schemeClr val="bg1"/>
+                </a:solidFill>
+              </a:rPr>
+              <a:t>Note for “N3” sensor users: in the rest of your program, you should only use the “angle” modes of the gyro. Using the “rate” or “rate and angle” mode will cause the gyro to recalibrate. “N4” sensor users can change modes without causing a recalibration. Mode changes do “reset” the angle to 0.</a:t>
+            </a:r>
+            <a:endParaRPr lang="en-US" dirty="0">
+              <a:solidFill>
+                <a:schemeClr val="bg1"/>
+              </a:solidFill>
+            </a:endParaRPr>
+          </a:p>
+        </p:txBody>
+      </p:sp>
+      <p:pic>
+        <p:nvPicPr>
+          <p:cNvPr id="11" name="Picture 10"/>
+          <p:cNvPicPr>
+            <a:picLocks noChangeAspect="1"/>
+          </p:cNvPicPr>
+          <p:nvPr/>
+        </p:nvPicPr>
+        <p:blipFill rotWithShape="1">
+          <a:blip r:embed="rId2" cstate="print">
+            <a:extLst>
+              <a:ext uri="{28A0092B-C50C-407E-A947-70E740481C1C}">
+                <a14:useLocalDpi xmlns:a14="http://schemas.microsoft.com/office/drawing/2010/main"/>
+              </a:ext>
+            </a:extLst>
+          </a:blip>
+          <a:srcRect/>
+          <a:stretch/>
+        </p:blipFill>
+        <p:spPr>
+          <a:xfrm>
+            <a:off x="638830" y="3543337"/>
+            <a:ext cx="5175489" cy="2530066"/>
+          </a:xfrm>
+          <a:prstGeom prst="rect">
+            <a:avLst/>
+          </a:prstGeom>
+        </p:spPr>
+      </p:pic>
+    </p:spTree>
+    <p:extLst>
+      <p:ext uri="{BB962C8B-B14F-4D97-AF65-F5344CB8AC3E}">
+        <p14:creationId xmlns:p14="http://schemas.microsoft.com/office/powerpoint/2010/main" val="23065229"/>
+      </p:ext>
+    </p:extLst>
+  </p:cSld>
+  <p:clrMapOvr>
+    <a:masterClrMapping/>
+  </p:clrMapOvr>
+</p:sld>
+</file>
+
+<file path=ppt/slides/slide11.xml><?xml version="1.0" encoding="utf-8"?>
+<p:sld xmlns:a="http://schemas.openxmlformats.org/drawingml/2006/main" xmlns:r="http://schemas.openxmlformats.org/officeDocument/2006/relationships" xmlns:p="http://schemas.openxmlformats.org/presentationml/2006/main">
+  <p:cSld>
+    <p:spTree>
+      <p:nvGrpSpPr>
+        <p:cNvPr id="1" name=""/>
+        <p:cNvGrpSpPr/>
+        <p:nvPr/>
+      </p:nvGrpSpPr>
+      <p:grpSpPr>
+        <a:xfrm>
+          <a:off x="0" y="0"/>
+          <a:ext cx="0" cy="0"/>
+          <a:chOff x="0" y="0"/>
+          <a:chExt cx="0" cy="0"/>
+        </a:xfrm>
+      </p:grpSpPr>
+      <p:sp>
+        <p:nvSpPr>
+          <p:cNvPr id="3" name="Footer Placeholder 2"/>
+          <p:cNvSpPr>
+            <a:spLocks noGrp="1"/>
+          </p:cNvSpPr>
+          <p:nvPr>
+            <p:ph type="ftr" sz="quarter" idx="11"/>
+          </p:nvPr>
+        </p:nvSpPr>
+        <p:spPr/>
+        <p:txBody>
+          <a:bodyPr/>
+          <a:lstStyle/>
+          <a:p>
+            <a:r>
+              <a:rPr lang="sk-SK" smtClean="0"/>
+              <a:t>© 2017 EV3Lessons.com, Last edit 8/07/2017</a:t>
+            </a:r>
+            <a:endParaRPr lang="en-US"/>
+          </a:p>
+        </p:txBody>
+      </p:sp>
+      <p:sp>
+        <p:nvSpPr>
           <p:cNvPr id="4" name="Slide Number Placeholder 3"/>
           <p:cNvSpPr>
             <a:spLocks noGrp="1"/>
@@ -5586,7 +6106,7 @@
           <a:p>
             <a:fld id="{4382A7F7-08BF-4252-8141-63FB96055BBB}" type="slidenum">
               <a:rPr lang="en-US" smtClean="0"/>
-              <a:t>10</a:t>
+              <a:t>11</a:t>
             </a:fld>
             <a:endParaRPr lang="en-US"/>
           </a:p>
@@ -5664,23 +6184,7 @@
                   <a:srgbClr val="000000"/>
                 </a:solidFill>
               </a:rPr>
-              <a:t> mode. This is </a:t>
-            </a:r>
-            <a:r>
-              <a:rPr lang="en-US" dirty="0" smtClean="0">
-                <a:solidFill>
-                  <a:srgbClr val="000000"/>
-                </a:solidFill>
-              </a:rPr>
-              <a:t>useful for “N3” users </a:t>
-            </a:r>
-            <a:r>
-              <a:rPr lang="en-US" dirty="0" smtClean="0">
-                <a:solidFill>
-                  <a:srgbClr val="000000"/>
-                </a:solidFill>
-              </a:rPr>
-              <a:t>if you use the rate output. </a:t>
+              <a:t> mode. This is useful for “N3” users if you use the rate output. </a:t>
             </a:r>
             <a:endParaRPr lang="en-US" dirty="0">
               <a:solidFill>
@@ -5705,10 +6209,7 @@
             <a:avLst/>
           </a:prstGeom>
           <a:solidFill>
-            <a:schemeClr val="accent4">
-              <a:lumMod val="60000"/>
-              <a:lumOff val="40000"/>
-            </a:schemeClr>
+            <a:srgbClr val="FFFF00"/>
           </a:solidFill>
         </p:spPr>
         <p:txBody>
@@ -5718,18 +6219,10 @@
           <a:lstStyle/>
           <a:p>
             <a:r>
-              <a:rPr lang="en-US" dirty="0" smtClean="0">
-                <a:solidFill>
-                  <a:srgbClr val="3366FF"/>
-                </a:solidFill>
-              </a:rPr>
+              <a:rPr lang="en-US" dirty="0" smtClean="0"/>
               <a:t>This version takes a little bit longer (4 vs. 3 seconds) than the Strategy 2 code in Intro to Gyro.</a:t>
             </a:r>
-            <a:endParaRPr lang="en-US" dirty="0">
-              <a:solidFill>
-                <a:srgbClr val="3366FF"/>
-              </a:solidFill>
-            </a:endParaRPr>
+            <a:endParaRPr lang="en-US" dirty="0"/>
           </a:p>
         </p:txBody>
       </p:sp>
@@ -5748,10 +6241,7 @@
             <a:avLst/>
           </a:prstGeom>
           <a:solidFill>
-            <a:schemeClr val="accent1">
-              <a:lumMod val="40000"/>
-              <a:lumOff val="60000"/>
-            </a:schemeClr>
+            <a:srgbClr val="FF0000"/>
           </a:solidFill>
         </p:spPr>
         <p:txBody>
@@ -5763,7 +6253,7 @@
             <a:r>
               <a:rPr lang="en-US" dirty="0">
                 <a:solidFill>
-                  <a:srgbClr val="3366FF"/>
+                  <a:schemeClr val="bg1"/>
                 </a:solidFill>
               </a:rPr>
               <a:t>Note for “N3” sensor users: </a:t>
@@ -5771,7 +6261,7 @@
             <a:r>
               <a:rPr lang="en-US" dirty="0" smtClean="0">
                 <a:solidFill>
-                  <a:srgbClr val="3366FF"/>
+                  <a:schemeClr val="bg1"/>
                 </a:solidFill>
               </a:rPr>
               <a:t>in </a:t>
@@ -5779,7 +6269,7 @@
             <a:r>
               <a:rPr lang="en-US" dirty="0">
                 <a:solidFill>
-                  <a:srgbClr val="3366FF"/>
+                  <a:schemeClr val="bg1"/>
                 </a:solidFill>
               </a:rPr>
               <a:t>the rest of your program, you should only use the “rate + angle” modes of the gyro. Using the "angle" or “rate” mode will cause the gyro to recalibrate. Also, ***DO NOT*** use the gyro reset </a:t>
@@ -5787,7 +6277,7 @@
             <a:r>
               <a:rPr lang="en-US" dirty="0" smtClean="0">
                 <a:solidFill>
-                  <a:srgbClr val="3366FF"/>
+                  <a:schemeClr val="bg1"/>
                 </a:solidFill>
               </a:rPr>
               <a:t>mode - </a:t>
@@ -5795,23 +6285,15 @@
             <a:r>
               <a:rPr lang="en-US" dirty="0">
                 <a:solidFill>
-                  <a:srgbClr val="3366FF"/>
+                  <a:schemeClr val="bg1"/>
                 </a:solidFill>
               </a:rPr>
-              <a:t>this forces the gyro into angle mode which will cause a long 3 second recalibration</a:t>
-            </a:r>
-            <a:r>
-              <a:rPr lang="en-US" dirty="0">
-                <a:solidFill>
-                  <a:srgbClr val="3366FF"/>
-                </a:solidFill>
-              </a:rPr>
-              <a:t>. “N4” sensor users can change modes without causing a </a:t>
+              <a:t>this forces the gyro into angle mode which will cause a long 3 second recalibration. “N4” sensor users can change modes without causing a </a:t>
             </a:r>
             <a:r>
               <a:rPr lang="en-US" dirty="0" smtClean="0">
                 <a:solidFill>
-                  <a:srgbClr val="3366FF"/>
+                  <a:schemeClr val="bg1"/>
                 </a:solidFill>
               </a:rPr>
               <a:t>recalibration. </a:t>
@@ -5819,7 +6301,7 @@
             <a:r>
               <a:rPr lang="en-US" dirty="0">
                 <a:solidFill>
-                  <a:srgbClr val="3366FF"/>
+                  <a:schemeClr val="bg1"/>
                 </a:solidFill>
               </a:rPr>
               <a:t>Mode changes do “reset” the angle to 0</a:t>
@@ -5827,14 +6309,14 @@
             <a:r>
               <a:rPr lang="en-US" dirty="0" smtClean="0">
                 <a:solidFill>
-                  <a:srgbClr val="3366FF"/>
+                  <a:schemeClr val="bg1"/>
                 </a:solidFill>
               </a:rPr>
               <a:t>.</a:t>
             </a:r>
             <a:endParaRPr lang="en-US" dirty="0">
               <a:solidFill>
-                <a:srgbClr val="3366FF"/>
+                <a:schemeClr val="bg1"/>
               </a:solidFill>
             </a:endParaRPr>
           </a:p>
@@ -5882,7 +6364,7 @@
 </p:sld>
 </file>
 
-<file path=ppt/slides/slide11.xml><?xml version="1.0" encoding="utf-8"?>
+<file path=ppt/slides/slide12.xml><?xml version="1.0" encoding="utf-8"?>
 <p:sld xmlns:a="http://schemas.openxmlformats.org/drawingml/2006/main" xmlns:r="http://schemas.openxmlformats.org/officeDocument/2006/relationships" xmlns:p="http://schemas.openxmlformats.org/presentationml/2006/main">
   <p:cSld>
     <p:spTree>
@@ -5915,24 +6397,8 @@
           <a:lstStyle/>
           <a:p>
             <a:r>
-              <a:rPr lang="sk-SK" dirty="0" smtClean="0"/>
-              <a:t>© 2017 EV3Lessons.com, </a:t>
-            </a:r>
-            <a:r>
-              <a:rPr lang="sk-SK" dirty="0" err="1" smtClean="0"/>
-              <a:t>Last</a:t>
-            </a:r>
-            <a:r>
-              <a:rPr lang="sk-SK" dirty="0" smtClean="0"/>
-              <a:t> </a:t>
-            </a:r>
-            <a:r>
-              <a:rPr lang="sk-SK" dirty="0" err="1" smtClean="0"/>
-              <a:t>edit</a:t>
-            </a:r>
-            <a:r>
-              <a:rPr lang="sk-SK" dirty="0" smtClean="0"/>
-              <a:t> 8/06/2017</a:t>
+              <a:rPr lang="sk-SK" smtClean="0"/>
+              <a:t>© 2017 EV3Lessons.com, Last edit 8/07/2017</a:t>
             </a:r>
             <a:endParaRPr lang="en-US" dirty="0"/>
           </a:p>
@@ -5955,7 +6421,7 @@
           <a:p>
             <a:fld id="{4382A7F7-08BF-4252-8141-63FB96055BBB}" type="slidenum">
               <a:rPr lang="en-US" smtClean="0"/>
-              <a:t>11</a:t>
+              <a:t>12</a:t>
             </a:fld>
             <a:endParaRPr lang="en-US"/>
           </a:p>
@@ -5999,10 +6465,7 @@
             <a:avLst/>
           </a:prstGeom>
           <a:solidFill>
-            <a:schemeClr val="accent1">
-              <a:lumMod val="40000"/>
-              <a:lumOff val="60000"/>
-            </a:schemeClr>
+            <a:srgbClr val="FF0000"/>
           </a:solidFill>
         </p:spPr>
         <p:txBody>
@@ -6014,7 +6477,7 @@
             <a:r>
               <a:rPr lang="en-US" dirty="0">
                 <a:solidFill>
-                  <a:srgbClr val="3366FF"/>
+                  <a:schemeClr val="bg1"/>
                 </a:solidFill>
               </a:rPr>
               <a:t>Note for “N3” sensor users: in the rest of your program, you should only use the “angle” modes of the gyro. Using the “rate” or “rate and angle” mode will cause the gyro to recalibrate. “N4” sensor users can change modes without causing </a:t>
@@ -6022,7 +6485,7 @@
             <a:r>
               <a:rPr lang="en-US" dirty="0" smtClean="0">
                 <a:solidFill>
-                  <a:srgbClr val="3366FF"/>
+                  <a:schemeClr val="bg1"/>
                 </a:solidFill>
               </a:rPr>
               <a:t>a recalibration. </a:t>
@@ -6030,7 +6493,7 @@
             <a:r>
               <a:rPr lang="en-US" dirty="0">
                 <a:solidFill>
-                  <a:srgbClr val="3366FF"/>
+                  <a:schemeClr val="bg1"/>
                 </a:solidFill>
               </a:rPr>
               <a:t>Mode changes do “reset” the angle to 0</a:t>
@@ -6038,14 +6501,14 @@
             <a:r>
               <a:rPr lang="en-US" dirty="0" smtClean="0">
                 <a:solidFill>
-                  <a:srgbClr val="3366FF"/>
+                  <a:schemeClr val="bg1"/>
                 </a:solidFill>
               </a:rPr>
               <a:t>.</a:t>
             </a:r>
             <a:endParaRPr lang="en-US" dirty="0">
               <a:solidFill>
-                <a:srgbClr val="3366FF"/>
+                <a:schemeClr val="bg1"/>
               </a:solidFill>
             </a:endParaRPr>
           </a:p>
@@ -6088,15 +6551,7 @@
             </a:r>
             <a:r>
               <a:rPr lang="en-US" dirty="0" smtClean="0"/>
-              <a:t> sec </a:t>
-            </a:r>
-            <a:r>
-              <a:rPr lang="en-US" dirty="0" smtClean="0"/>
-              <a:t>to </a:t>
-            </a:r>
-            <a:r>
-              <a:rPr lang="en-US" dirty="0" smtClean="0"/>
-              <a:t>run (vs. 0.1 sec for the Strategy 3 code in Intro to Gyro)</a:t>
+              <a:t> sec to run (vs. 0.1 sec for the Strategy 3 code in Intro to Gyro)</a:t>
             </a:r>
             <a:endParaRPr lang="en-US" dirty="0"/>
           </a:p>
@@ -6145,7 +6600,7 @@
 </p:sld>
 </file>
 
-<file path=ppt/slides/slide12.xml><?xml version="1.0" encoding="utf-8"?>
+<file path=ppt/slides/slide13.xml><?xml version="1.0" encoding="utf-8"?>
 <p:sld xmlns:a="http://schemas.openxmlformats.org/drawingml/2006/main" xmlns:r="http://schemas.openxmlformats.org/officeDocument/2006/relationships" xmlns:p="http://schemas.openxmlformats.org/presentationml/2006/main">
   <p:cSld>
     <p:spTree>
@@ -6179,7 +6634,7 @@
           <a:p>
             <a:r>
               <a:rPr lang="sk-SK" smtClean="0"/>
-              <a:t>© 2017 EV3Lessons.com, Last edit 8/06/2017</a:t>
+              <a:t>© 2017 EV3Lessons.com, Last edit 8/07/2017</a:t>
             </a:r>
             <a:endParaRPr lang="en-US"/>
           </a:p>
@@ -6202,7 +6657,7 @@
           <a:p>
             <a:fld id="{4382A7F7-08BF-4252-8141-63FB96055BBB}" type="slidenum">
               <a:rPr lang="en-US" smtClean="0"/>
-              <a:t>12</a:t>
+              <a:t>13</a:t>
             </a:fld>
             <a:endParaRPr lang="en-US"/>
           </a:p>
@@ -6246,10 +6701,7 @@
             <a:avLst/>
           </a:prstGeom>
           <a:solidFill>
-            <a:schemeClr val="accent1">
-              <a:lumMod val="40000"/>
-              <a:lumOff val="60000"/>
-            </a:schemeClr>
+            <a:srgbClr val="FF0000"/>
           </a:solidFill>
         </p:spPr>
         <p:txBody>
@@ -6261,7 +6713,7 @@
             <a:r>
               <a:rPr lang="en-US" dirty="0">
                 <a:solidFill>
-                  <a:srgbClr val="3366FF"/>
+                  <a:schemeClr val="bg1"/>
                 </a:solidFill>
               </a:rPr>
               <a:t>Note for “N3” sensor users: in the rest of your program, you should only use the “rate + angle” modes of the gyro. Using the "angle" or “rate” mode will cause the gyro to recalibrate. Also, ***DO NOT*** use the gyro reset - this forces the gyro into angle mode which will cause a long 3 second recalibration. “N4” sensor users can change modes without causing a </a:t>
@@ -6269,7 +6721,7 @@
             <a:r>
               <a:rPr lang="en-US" dirty="0" smtClean="0">
                 <a:solidFill>
-                  <a:srgbClr val="3366FF"/>
+                  <a:schemeClr val="bg1"/>
                 </a:solidFill>
               </a:rPr>
               <a:t>recalibration. </a:t>
@@ -6277,7 +6729,7 @@
             <a:r>
               <a:rPr lang="en-US" dirty="0">
                 <a:solidFill>
-                  <a:srgbClr val="3366FF"/>
+                  <a:schemeClr val="bg1"/>
                 </a:solidFill>
               </a:rPr>
               <a:t>Mode changes do “reset” the angle to 0</a:t>
@@ -6285,14 +6737,14 @@
             <a:r>
               <a:rPr lang="en-US" dirty="0" smtClean="0">
                 <a:solidFill>
-                  <a:srgbClr val="3366FF"/>
+                  <a:schemeClr val="bg1"/>
                 </a:solidFill>
               </a:rPr>
               <a:t>.</a:t>
             </a:r>
             <a:endParaRPr lang="en-US" dirty="0">
               <a:solidFill>
-                <a:srgbClr val="3366FF"/>
+                <a:schemeClr val="bg1"/>
               </a:solidFill>
             </a:endParaRPr>
           </a:p>
@@ -6357,11 +6809,6 @@
               </a:rPr>
               <a:t>This is useful for “N3” users if you use the rate output. </a:t>
             </a:r>
-            <a:endParaRPr lang="en-US" dirty="0">
-              <a:solidFill>
-                <a:srgbClr val="000000"/>
-              </a:solidFill>
-            </a:endParaRPr>
           </a:p>
         </p:txBody>
       </p:sp>
@@ -6408,159 +6855,6 @@
 </p:sld>
 </file>
 
-<file path=ppt/slides/slide13.xml><?xml version="1.0" encoding="utf-8"?>
-<p:sld xmlns:a="http://schemas.openxmlformats.org/drawingml/2006/main" xmlns:r="http://schemas.openxmlformats.org/officeDocument/2006/relationships" xmlns:p="http://schemas.openxmlformats.org/presentationml/2006/main">
-  <p:cSld>
-    <p:spTree>
-      <p:nvGrpSpPr>
-        <p:cNvPr id="1" name=""/>
-        <p:cNvGrpSpPr/>
-        <p:nvPr/>
-      </p:nvGrpSpPr>
-      <p:grpSpPr>
-        <a:xfrm>
-          <a:off x="0" y="0"/>
-          <a:ext cx="0" cy="0"/>
-          <a:chOff x="0" y="0"/>
-          <a:chExt cx="0" cy="0"/>
-        </a:xfrm>
-      </p:grpSpPr>
-      <p:sp>
-        <p:nvSpPr>
-          <p:cNvPr id="2" name="Content Placeholder 1"/>
-          <p:cNvSpPr>
-            <a:spLocks noGrp="1"/>
-          </p:cNvSpPr>
-          <p:nvPr>
-            <p:ph idx="1"/>
-          </p:nvPr>
-        </p:nvSpPr>
-        <p:spPr>
-          <a:xfrm>
-            <a:off x="284163" y="1818870"/>
-            <a:ext cx="8574087" cy="4618162"/>
-          </a:xfrm>
-        </p:spPr>
-        <p:txBody>
-          <a:bodyPr>
-            <a:normAutofit fontScale="92500" lnSpcReduction="20000"/>
-          </a:bodyPr>
-          <a:lstStyle/>
-          <a:p>
-            <a:r>
-              <a:rPr lang="en-US" dirty="0" smtClean="0"/>
-              <a:t>The new gyro calibration strategies in this lesson work for either the “N3” or “N4” sensors</a:t>
-            </a:r>
-          </a:p>
-          <a:p>
-            <a:r>
-              <a:rPr lang="en-US" dirty="0" smtClean="0"/>
-              <a:t>Note that all the new recalibrations take about 3-4 seconds. This is significantly more than the previous strategy 1 and 3 (in the Intro to Gyro lesson) which left the gyro in angle reading mode (0.1 sec vs. 3-4 secs)</a:t>
-            </a:r>
-          </a:p>
-          <a:p>
-            <a:pPr lvl="1"/>
-            <a:r>
-              <a:rPr lang="en-US" dirty="0" smtClean="0"/>
-              <a:t>Therefore, if you have an older “N3” gyro, you might want to use the old code that took less time to recalibrate.</a:t>
-            </a:r>
-          </a:p>
-          <a:p>
-            <a:r>
-              <a:rPr lang="en-US" dirty="0" smtClean="0"/>
-              <a:t>The newer “N4” sensors allow you to use different gyro modes inside a program without causing a recalibration.</a:t>
-            </a:r>
-          </a:p>
-          <a:p>
-            <a:r>
-              <a:rPr lang="en-US" i="1" dirty="0" smtClean="0"/>
-              <a:t>Note: it seems that there was a hardware change between the “N3” and “N4” gyro. If you take apart your gyro, we would love to get pictures and details. </a:t>
-            </a:r>
-          </a:p>
-        </p:txBody>
-      </p:sp>
-      <p:sp>
-        <p:nvSpPr>
-          <p:cNvPr id="3" name="Footer Placeholder 2"/>
-          <p:cNvSpPr>
-            <a:spLocks noGrp="1"/>
-          </p:cNvSpPr>
-          <p:nvPr>
-            <p:ph type="ftr" sz="quarter" idx="11"/>
-          </p:nvPr>
-        </p:nvSpPr>
-        <p:spPr/>
-        <p:txBody>
-          <a:bodyPr/>
-          <a:lstStyle/>
-          <a:p>
-            <a:r>
-              <a:rPr lang="sk-SK" smtClean="0"/>
-              <a:t>© 2017 EV3Lessons.com, Last edit 8/06/2017</a:t>
-            </a:r>
-            <a:endParaRPr lang="en-US"/>
-          </a:p>
-        </p:txBody>
-      </p:sp>
-      <p:sp>
-        <p:nvSpPr>
-          <p:cNvPr id="4" name="Slide Number Placeholder 3"/>
-          <p:cNvSpPr>
-            <a:spLocks noGrp="1"/>
-          </p:cNvSpPr>
-          <p:nvPr>
-            <p:ph type="sldNum" sz="quarter" idx="12"/>
-          </p:nvPr>
-        </p:nvSpPr>
-        <p:spPr/>
-        <p:txBody>
-          <a:bodyPr/>
-          <a:lstStyle/>
-          <a:p>
-            <a:fld id="{4382A7F7-08BF-4252-8141-63FB96055BBB}" type="slidenum">
-              <a:rPr lang="en-US" smtClean="0"/>
-              <a:t>13</a:t>
-            </a:fld>
-            <a:endParaRPr lang="en-US"/>
-          </a:p>
-        </p:txBody>
-      </p:sp>
-      <p:sp>
-        <p:nvSpPr>
-          <p:cNvPr id="5" name="Title 4"/>
-          <p:cNvSpPr>
-            <a:spLocks noGrp="1"/>
-          </p:cNvSpPr>
-          <p:nvPr>
-            <p:ph type="title"/>
-          </p:nvPr>
-        </p:nvSpPr>
-        <p:spPr/>
-        <p:txBody>
-          <a:bodyPr/>
-          <a:lstStyle/>
-          <a:p>
-            <a:r>
-              <a:rPr lang="en-US" dirty="0" smtClean="0"/>
-              <a:t>Discussion</a:t>
-            </a:r>
-            <a:endParaRPr lang="en-US" dirty="0"/>
-          </a:p>
-        </p:txBody>
-      </p:sp>
-    </p:spTree>
-    <p:extLst>
-      <p:ext uri="{BB962C8B-B14F-4D97-AF65-F5344CB8AC3E}">
-        <p14:creationId xmlns:p14="http://schemas.microsoft.com/office/powerpoint/2010/main" val="1524525794"/>
-      </p:ext>
-    </p:extLst>
-  </p:cSld>
-  <p:clrMapOvr>
-    <a:masterClrMapping/>
-  </p:clrMapOvr>
-</p:sld>
-</file>
-
 <file path=ppt/slides/slide14.xml><?xml version="1.0" encoding="utf-8"?>
 <p:sld xmlns:a="http://schemas.openxmlformats.org/drawingml/2006/main" xmlns:r="http://schemas.openxmlformats.org/officeDocument/2006/relationships" xmlns:p="http://schemas.openxmlformats.org/presentationml/2006/main">
   <p:cSld>
@@ -6580,6 +6874,167 @@
       </p:grpSpPr>
       <p:sp>
         <p:nvSpPr>
+          <p:cNvPr id="2" name="Content Placeholder 1"/>
+          <p:cNvSpPr>
+            <a:spLocks noGrp="1"/>
+          </p:cNvSpPr>
+          <p:nvPr>
+            <p:ph idx="1"/>
+          </p:nvPr>
+        </p:nvSpPr>
+        <p:spPr>
+          <a:xfrm>
+            <a:off x="284163" y="1818870"/>
+            <a:ext cx="8574087" cy="4618162"/>
+          </a:xfrm>
+        </p:spPr>
+        <p:txBody>
+          <a:bodyPr>
+            <a:normAutofit fontScale="92500" lnSpcReduction="20000"/>
+          </a:bodyPr>
+          <a:lstStyle/>
+          <a:p>
+            <a:r>
+              <a:rPr lang="en-US" dirty="0" smtClean="0"/>
+              <a:t>The new gyro calibration strategies in this lesson work for either the “N3” or “N4” sensors (*also been tested on </a:t>
+            </a:r>
+            <a:r>
+              <a:rPr lang="en-US" dirty="0" smtClean="0"/>
+              <a:t>“N6</a:t>
+            </a:r>
+            <a:r>
+              <a:rPr lang="en-US" dirty="0" smtClean="0"/>
+              <a:t>”)</a:t>
+            </a:r>
+          </a:p>
+          <a:p>
+            <a:r>
+              <a:rPr lang="en-US" dirty="0" smtClean="0"/>
+              <a:t>Note that all the new recalibrations take about 3-4 seconds. This is significantly more than the previous strategy 1 and 3 (in the Intro to Gyro lesson) which left the gyro in angle reading mode (0.1 sec vs. 3-4 secs)</a:t>
+            </a:r>
+          </a:p>
+          <a:p>
+            <a:pPr lvl="1"/>
+            <a:r>
+              <a:rPr lang="en-US" dirty="0" smtClean="0"/>
+              <a:t>Therefore, if you have an older “N3” gyro, you might want to use the old code that took less time to recalibrate.</a:t>
+            </a:r>
+          </a:p>
+          <a:p>
+            <a:r>
+              <a:rPr lang="en-US" dirty="0" smtClean="0"/>
+              <a:t>The newer “N4” sensors allow you to use different gyro modes inside a program without causing a recalibration.</a:t>
+            </a:r>
+          </a:p>
+          <a:p>
+            <a:r>
+              <a:rPr lang="en-US" i="1" dirty="0" smtClean="0"/>
+              <a:t>Note: it seems that there was a hardware change between the “N3” and “N4” gyro. If you take apart your gyro, we would love to get pictures and details. </a:t>
+            </a:r>
+          </a:p>
+        </p:txBody>
+      </p:sp>
+      <p:sp>
+        <p:nvSpPr>
+          <p:cNvPr id="3" name="Footer Placeholder 2"/>
+          <p:cNvSpPr>
+            <a:spLocks noGrp="1"/>
+          </p:cNvSpPr>
+          <p:nvPr>
+            <p:ph type="ftr" sz="quarter" idx="11"/>
+          </p:nvPr>
+        </p:nvSpPr>
+        <p:spPr/>
+        <p:txBody>
+          <a:bodyPr/>
+          <a:lstStyle/>
+          <a:p>
+            <a:r>
+              <a:rPr lang="sk-SK" smtClean="0"/>
+              <a:t>© 2017 EV3Lessons.com, Last edit 8/07/2017</a:t>
+            </a:r>
+            <a:endParaRPr lang="en-US"/>
+          </a:p>
+        </p:txBody>
+      </p:sp>
+      <p:sp>
+        <p:nvSpPr>
+          <p:cNvPr id="4" name="Slide Number Placeholder 3"/>
+          <p:cNvSpPr>
+            <a:spLocks noGrp="1"/>
+          </p:cNvSpPr>
+          <p:nvPr>
+            <p:ph type="sldNum" sz="quarter" idx="12"/>
+          </p:nvPr>
+        </p:nvSpPr>
+        <p:spPr/>
+        <p:txBody>
+          <a:bodyPr/>
+          <a:lstStyle/>
+          <a:p>
+            <a:fld id="{4382A7F7-08BF-4252-8141-63FB96055BBB}" type="slidenum">
+              <a:rPr lang="en-US" smtClean="0"/>
+              <a:t>14</a:t>
+            </a:fld>
+            <a:endParaRPr lang="en-US"/>
+          </a:p>
+        </p:txBody>
+      </p:sp>
+      <p:sp>
+        <p:nvSpPr>
+          <p:cNvPr id="5" name="Title 4"/>
+          <p:cNvSpPr>
+            <a:spLocks noGrp="1"/>
+          </p:cNvSpPr>
+          <p:nvPr>
+            <p:ph type="title"/>
+          </p:nvPr>
+        </p:nvSpPr>
+        <p:spPr/>
+        <p:txBody>
+          <a:bodyPr/>
+          <a:lstStyle/>
+          <a:p>
+            <a:r>
+              <a:rPr lang="en-US" dirty="0" smtClean="0"/>
+              <a:t>Discussion</a:t>
+            </a:r>
+            <a:endParaRPr lang="en-US" dirty="0"/>
+          </a:p>
+        </p:txBody>
+      </p:sp>
+    </p:spTree>
+    <p:extLst>
+      <p:ext uri="{BB962C8B-B14F-4D97-AF65-F5344CB8AC3E}">
+        <p14:creationId xmlns:p14="http://schemas.microsoft.com/office/powerpoint/2010/main" val="1524525794"/>
+      </p:ext>
+    </p:extLst>
+  </p:cSld>
+  <p:clrMapOvr>
+    <a:masterClrMapping/>
+  </p:clrMapOvr>
+</p:sld>
+</file>
+
+<file path=ppt/slides/slide15.xml><?xml version="1.0" encoding="utf-8"?>
+<p:sld xmlns:a="http://schemas.openxmlformats.org/drawingml/2006/main" xmlns:r="http://schemas.openxmlformats.org/officeDocument/2006/relationships" xmlns:p="http://schemas.openxmlformats.org/presentationml/2006/main">
+  <p:cSld>
+    <p:spTree>
+      <p:nvGrpSpPr>
+        <p:cNvPr id="1" name=""/>
+        <p:cNvGrpSpPr/>
+        <p:nvPr/>
+      </p:nvGrpSpPr>
+      <p:grpSpPr>
+        <a:xfrm>
+          <a:off x="0" y="0"/>
+          <a:ext cx="0" cy="0"/>
+          <a:chOff x="0" y="0"/>
+          <a:chExt cx="0" cy="0"/>
+        </a:xfrm>
+      </p:grpSpPr>
+      <p:sp>
+        <p:nvSpPr>
           <p:cNvPr id="3" name="Content Placeholder 2"/>
           <p:cNvSpPr>
             <a:spLocks noGrp="1"/>
@@ -6597,16 +7052,11 @@
               <a:rPr lang="en-US" dirty="0" smtClean="0"/>
               <a:t>This tutorial was written by Sanjay Seshan and Arvind Seshan </a:t>
             </a:r>
-            <a:endParaRPr lang="en-US" dirty="0" smtClean="0"/>
           </a:p>
           <a:p>
             <a:r>
               <a:rPr lang="en-US" dirty="0" smtClean="0"/>
-              <a:t>More </a:t>
-            </a:r>
-            <a:r>
-              <a:rPr lang="en-US" dirty="0" smtClean="0"/>
-              <a:t>lessons at </a:t>
+              <a:t>More lessons at </a:t>
             </a:r>
             <a:r>
               <a:rPr lang="en-US" dirty="0" smtClean="0">
@@ -6642,7 +7092,7 @@
           <a:p>
             <a:r>
               <a:rPr lang="sk-SK" smtClean="0"/>
-              <a:t>© 2017 EV3Lessons.com, Last edit 8/06/2017</a:t>
+              <a:t>© 2017 EV3Lessons.com, Last edit 8/07/2017</a:t>
             </a:r>
             <a:endParaRPr lang="en-US"/>
           </a:p>
@@ -7085,7 +7535,7 @@
           <a:p>
             <a:fld id="{4382A7F7-08BF-4252-8141-63FB96055BBB}" type="slidenum">
               <a:rPr lang="en-US" smtClean="0"/>
-              <a:t>14</a:t>
+              <a:t>15</a:t>
             </a:fld>
             <a:endParaRPr lang="en-US"/>
           </a:p>
@@ -7171,7 +7621,6 @@
               <a:rPr lang="en-US" dirty="0" smtClean="0"/>
               <a:t>Learn how to how to deal with gyro drift with this updated information about the gyro sensor.</a:t>
             </a:r>
-            <a:endParaRPr lang="en-US" dirty="0" smtClean="0"/>
           </a:p>
           <a:p>
             <a:pPr marL="0" indent="0">
@@ -7179,13 +7628,8 @@
             </a:pPr>
             <a:r>
               <a:rPr lang="en-US" dirty="0" smtClean="0"/>
-              <a:t>Prerequisites: Data wires, Loops, Logic &amp; Comparison </a:t>
-            </a:r>
-            <a:r>
-              <a:rPr lang="en-US" dirty="0" smtClean="0"/>
-              <a:t>Blocks, Introduction to Gyro</a:t>
-            </a:r>
-            <a:endParaRPr lang="en-US" dirty="0" smtClean="0"/>
+              <a:t>Prerequisites: Data wires, Loops, Logic &amp; Comparison Blocks, Introduction to Gyro</a:t>
+            </a:r>
           </a:p>
         </p:txBody>
       </p:sp>
@@ -7206,7 +7650,7 @@
           <a:p>
             <a:r>
               <a:rPr lang="sk-SK" smtClean="0"/>
-              <a:t>© 2017 EV3Lessons.com, Last edit 8/06/2017</a:t>
+              <a:t>© 2017 EV3Lessons.com, Last edit 8/07/2017</a:t>
             </a:r>
             <a:endParaRPr lang="en-US"/>
           </a:p>
@@ -7342,7 +7786,7 @@
           <a:p>
             <a:r>
               <a:rPr lang="sk-SK" smtClean="0"/>
-              <a:t>© 2017 EV3Lessons.com, Last edit 8/06/2017</a:t>
+              <a:t>© 2017 EV3Lessons.com, Last edit 8/07/2017</a:t>
             </a:r>
             <a:endParaRPr lang="en-US"/>
           </a:p>
@@ -7480,7 +7924,7 @@
           <a:p>
             <a:r>
               <a:rPr lang="en-US" sz="2000" dirty="0" smtClean="0"/>
-              <a:t>This is an big issue for anyone using one of the gyro sensors that does not recalibrate with this code.</a:t>
+              <a:t>This is a big issue for anyone using one of the gyro sensors that does not recalibrate with this code.</a:t>
             </a:r>
             <a:r>
               <a:rPr lang="en-US" sz="2000" dirty="0"/>
@@ -7509,24 +7953,8 @@
           <a:lstStyle/>
           <a:p>
             <a:r>
-              <a:rPr lang="sk-SK" dirty="0" smtClean="0"/>
-              <a:t>© 2017 EV3Lessons.com, </a:t>
-            </a:r>
-            <a:r>
-              <a:rPr lang="sk-SK" dirty="0" err="1" smtClean="0"/>
-              <a:t>Last</a:t>
-            </a:r>
-            <a:r>
-              <a:rPr lang="sk-SK" dirty="0" smtClean="0"/>
-              <a:t> </a:t>
-            </a:r>
-            <a:r>
-              <a:rPr lang="sk-SK" dirty="0" err="1" smtClean="0"/>
-              <a:t>edit</a:t>
-            </a:r>
-            <a:r>
-              <a:rPr lang="sk-SK" dirty="0" smtClean="0"/>
-              <a:t> 8/06/2017</a:t>
+              <a:rPr lang="sk-SK" smtClean="0"/>
+              <a:t>© 2017 EV3Lessons.com, Last edit 8/07/2017</a:t>
             </a:r>
             <a:endParaRPr lang="en-US" dirty="0"/>
           </a:p>
@@ -7572,7 +8000,7 @@
           <p:nvPr/>
         </p:nvPicPr>
         <p:blipFill rotWithShape="1">
-          <a:blip r:embed="rId2" cstate="print">
+          <a:blip r:embed="rId3" cstate="print">
             <a:extLst>
               <a:ext uri="{28A0092B-C50C-407E-A947-70E740481C1C}">
                 <a14:useLocalDpi xmlns:a14="http://schemas.microsoft.com/office/drawing/2010/main"/>
@@ -7601,7 +8029,7 @@
           <p:nvPr/>
         </p:nvPicPr>
         <p:blipFill rotWithShape="1">
-          <a:blip r:embed="rId3" cstate="print">
+          <a:blip r:embed="rId4" cstate="print">
             <a:extLst>
               <a:ext uri="{28A0092B-C50C-407E-A947-70E740481C1C}">
                 <a14:useLocalDpi xmlns:a14="http://schemas.microsoft.com/office/drawing/2010/main"/>
@@ -7630,7 +8058,7 @@
           <p:nvPr/>
         </p:nvPicPr>
         <p:blipFill rotWithShape="1">
-          <a:blip r:embed="rId4" cstate="print">
+          <a:blip r:embed="rId5" cstate="print">
             <a:extLst>
               <a:ext uri="{28A0092B-C50C-407E-A947-70E740481C1C}">
                 <a14:useLocalDpi xmlns:a14="http://schemas.microsoft.com/office/drawing/2010/main"/>
@@ -7659,7 +8087,7 @@
           <p:nvPr/>
         </p:nvPicPr>
         <p:blipFill rotWithShape="1">
-          <a:blip r:embed="rId5" cstate="print">
+          <a:blip r:embed="rId6" cstate="print">
             <a:extLst>
               <a:ext uri="{28A0092B-C50C-407E-A947-70E740481C1C}">
                 <a14:useLocalDpi xmlns:a14="http://schemas.microsoft.com/office/drawing/2010/main"/>
@@ -7830,8 +8258,8 @@
         </p:nvSpPr>
         <p:spPr>
           <a:xfrm>
-            <a:off x="4498259" y="1430594"/>
-            <a:ext cx="4442540" cy="369332"/>
+            <a:off x="4326673" y="1436095"/>
+            <a:ext cx="4714487" cy="369332"/>
           </a:xfrm>
           <a:prstGeom prst="rect">
             <a:avLst/>
@@ -7847,7 +8275,7 @@
             <a:pPr algn="ctr"/>
             <a:r>
               <a:rPr lang="en-US" b="1" u="sng" dirty="0" smtClean="0"/>
-              <a:t>Reset Methods from “Introduction to Gyro”</a:t>
+              <a:t>Recalibration Methods from “Intro to Gyro”</a:t>
             </a:r>
             <a:endParaRPr lang="en-US" b="1" u="sng" dirty="0"/>
           </a:p>
@@ -8066,24 +8494,8 @@
           <a:lstStyle/>
           <a:p>
             <a:r>
-              <a:rPr lang="sk-SK" dirty="0" smtClean="0"/>
-              <a:t>© 2017 EV3Lessons.com, </a:t>
-            </a:r>
-            <a:r>
-              <a:rPr lang="sk-SK" dirty="0" err="1" smtClean="0"/>
-              <a:t>Last</a:t>
-            </a:r>
-            <a:r>
-              <a:rPr lang="sk-SK" dirty="0" smtClean="0"/>
-              <a:t> </a:t>
-            </a:r>
-            <a:r>
-              <a:rPr lang="sk-SK" dirty="0" err="1" smtClean="0"/>
-              <a:t>edit</a:t>
-            </a:r>
-            <a:r>
-              <a:rPr lang="sk-SK" dirty="0" smtClean="0"/>
-              <a:t> 8/06/2017</a:t>
+              <a:rPr lang="sk-SK" smtClean="0"/>
+              <a:t>© 2017 EV3Lessons.com, Last edit 8/07/2017</a:t>
             </a:r>
             <a:endParaRPr lang="en-US" dirty="0"/>
           </a:p>
@@ -8165,7 +8577,7 @@
         </p:blipFill>
         <p:spPr>
           <a:xfrm rot="16200000">
-            <a:off x="6518787" y="3482783"/>
+            <a:off x="6432499" y="3442086"/>
             <a:ext cx="1917291" cy="4072597"/>
           </a:xfrm>
           <a:prstGeom prst="rect">
@@ -8181,7 +8593,7 @@
         </p:nvSpPr>
         <p:spPr>
           <a:xfrm>
-            <a:off x="6913761" y="4959645"/>
+            <a:off x="6567693" y="5216123"/>
             <a:ext cx="663677" cy="1012055"/>
           </a:xfrm>
           <a:prstGeom prst="ellipse">
@@ -8265,7 +8677,7 @@
         </p:spPr>
         <p:txBody>
           <a:bodyPr>
-            <a:normAutofit fontScale="85000" lnSpcReduction="20000"/>
+            <a:normAutofit fontScale="92500" lnSpcReduction="10000"/>
           </a:bodyPr>
           <a:lstStyle/>
           <a:p>
@@ -8301,47 +8713,38 @@
             </a:r>
             <a:r>
               <a:rPr lang="en-US" dirty="0" smtClean="0"/>
-              <a:t>work.</a:t>
-            </a:r>
-          </a:p>
-          <a:p>
-            <a:r>
-              <a:rPr lang="en-US" dirty="0" smtClean="0"/>
-              <a:t>There are 7 </a:t>
-            </a:r>
-            <a:r>
-              <a:rPr lang="en-US" dirty="0" err="1" smtClean="0"/>
-              <a:t>numbrers</a:t>
-            </a:r>
-            <a:r>
-              <a:rPr lang="en-US" dirty="0" smtClean="0"/>
-              <a:t> on the charts although we have data for 12. This is because the numbers are repeated</a:t>
+              <a:t>work</a:t>
             </a:r>
             <a:r>
               <a:rPr lang="en-US" dirty="0"/>
-              <a:t> </a:t>
-            </a:r>
-            <a:r>
-              <a:rPr lang="en-US" dirty="0" smtClean="0"/>
-              <a:t>on some of the sensors (not unique numbers).</a:t>
-            </a:r>
-          </a:p>
-          <a:p>
+              <a:t>. We only own N3 and N4. </a:t>
+            </a:r>
             <a:endParaRPr lang="en-US" dirty="0" smtClean="0"/>
           </a:p>
           <a:p>
             <a:r>
-              <a:rPr lang="en-US" sz="1600" i="1" dirty="0" smtClean="0"/>
+              <a:rPr lang="en-US" sz="1900" i="1" dirty="0" smtClean="0"/>
+              <a:t>* </a:t>
+            </a:r>
+            <a:r>
+              <a:rPr lang="en-US" sz="1900" i="1" dirty="0" smtClean="0"/>
+              <a:t>These test results were reported by others</a:t>
+            </a:r>
+            <a:endParaRPr lang="en-US" sz="1900" i="1" dirty="0" smtClean="0"/>
+          </a:p>
+          <a:p>
+            <a:r>
+              <a:rPr lang="en-US" sz="1700" i="1" dirty="0" smtClean="0"/>
               <a:t>Note: If you complete this lesson and discover new numbers to add to the list, please email them to us at </a:t>
             </a:r>
             <a:r>
-              <a:rPr lang="en-US" sz="1600" i="1" dirty="0" smtClean="0">
+              <a:rPr lang="en-US" sz="1700" i="1" dirty="0" smtClean="0">
                 <a:hlinkClick r:id="rId2"/>
               </a:rPr>
               <a:t>team@ev3lessons.com</a:t>
             </a:r>
             <a:r>
-              <a:rPr lang="en-US" sz="1600" i="1" dirty="0" smtClean="0"/>
+              <a:rPr lang="en-US" sz="1700" i="1" dirty="0" smtClean="0"/>
               <a:t>.  </a:t>
             </a:r>
           </a:p>
@@ -8366,24 +8769,8 @@
           <a:lstStyle/>
           <a:p>
             <a:r>
-              <a:rPr lang="sk-SK" dirty="0" smtClean="0"/>
-              <a:t>© 2017 EV3Lessons.com, </a:t>
-            </a:r>
-            <a:r>
-              <a:rPr lang="sk-SK" dirty="0" err="1" smtClean="0"/>
-              <a:t>Last</a:t>
-            </a:r>
-            <a:r>
-              <a:rPr lang="sk-SK" dirty="0" smtClean="0"/>
-              <a:t> </a:t>
-            </a:r>
-            <a:r>
-              <a:rPr lang="sk-SK" dirty="0" err="1" smtClean="0"/>
-              <a:t>edit</a:t>
-            </a:r>
-            <a:r>
-              <a:rPr lang="sk-SK" dirty="0" smtClean="0"/>
-              <a:t> 8/06/2017</a:t>
+              <a:rPr lang="sk-SK" smtClean="0"/>
+              <a:t>© 2017 EV3Lessons.com, Last edit 8/07/2017</a:t>
             </a:r>
             <a:endParaRPr lang="en-US" dirty="0"/>
           </a:p>
@@ -8421,14 +8808,14 @@
           <p:nvPr>
             <p:extLst>
               <p:ext uri="{D42A27DB-BD31-4B8C-83A1-F6EECF244321}">
-                <p14:modId xmlns:p14="http://schemas.microsoft.com/office/powerpoint/2010/main" val="1102027332"/>
+                <p14:modId xmlns:p14="http://schemas.microsoft.com/office/powerpoint/2010/main" val="491503511"/>
               </p:ext>
             </p:extLst>
           </p:nvPr>
         </p:nvGraphicFramePr>
         <p:xfrm>
-          <a:off x="5515896" y="1569074"/>
-          <a:ext cx="3259394" cy="3739670"/>
+          <a:off x="5515896" y="1520946"/>
+          <a:ext cx="3259394" cy="2878932"/>
         </p:xfrm>
         <a:graphic>
           <a:graphicData uri="http://schemas.openxmlformats.org/drawingml/2006/table">
@@ -8440,7 +8827,7 @@
                 <a:gridCol w="1629697"/>
                 <a:gridCol w="1629697"/>
               </a:tblGrid>
-              <a:tr h="747934">
+              <a:tr h="526984">
                 <a:tc>
                   <a:txBody>
                     <a:bodyPr/>
@@ -8472,7 +8859,7 @@
                   <a:tcPr/>
                 </a:tc>
               </a:tr>
-              <a:tr h="747934">
+              <a:tr h="508006">
                 <a:tc>
                   <a:txBody>
                     <a:bodyPr/>
@@ -8504,7 +8891,7 @@
                   <a:tcPr/>
                 </a:tc>
               </a:tr>
-              <a:tr h="747934">
+              <a:tr h="429452">
                 <a:tc>
                   <a:txBody>
                     <a:bodyPr/>
@@ -8547,15 +8934,11 @@
                         <a:t>21N4</a:t>
                       </a:r>
                     </a:p>
-                    <a:p>
-                      <a:pPr algn="ctr"/>
-                      <a:endParaRPr lang="en-US" dirty="0"/>
-                    </a:p>
                   </a:txBody>
                   <a:tcPr/>
                 </a:tc>
               </a:tr>
-              <a:tr h="747934">
+              <a:tr h="526984">
                 <a:tc>
                   <a:txBody>
                     <a:bodyPr/>
@@ -8598,22 +8981,18 @@
                         <a:t>38N4</a:t>
                       </a:r>
                     </a:p>
-                    <a:p>
-                      <a:pPr algn="ctr"/>
-                      <a:endParaRPr lang="en-US" dirty="0"/>
-                    </a:p>
                   </a:txBody>
                   <a:tcPr/>
                 </a:tc>
               </a:tr>
-              <a:tr h="747934">
+              <a:tr h="408650">
                 <a:tc>
                   <a:txBody>
                     <a:bodyPr/>
                     <a:lstStyle/>
                     <a:p>
                       <a:pPr algn="ctr"/>
-                      <a:endParaRPr lang="en-US"/>
+                      <a:endParaRPr lang="en-US" dirty="0"/>
                     </a:p>
                   </a:txBody>
                   <a:tcPr/>
@@ -8645,8 +9024,40 @@
                         <a:t>39N4</a:t>
                       </a:r>
                     </a:p>
+                  </a:txBody>
+                  <a:tcPr/>
+                </a:tc>
+              </a:tr>
+              <a:tr h="317632">
+                <a:tc>
+                  <a:txBody>
+                    <a:bodyPr/>
+                    <a:lstStyle/>
                     <a:p>
                       <a:pPr algn="ctr"/>
+                      <a:endParaRPr lang="en-US"/>
+                    </a:p>
+                  </a:txBody>
+                  <a:tcPr/>
+                </a:tc>
+                <a:tc>
+                  <a:txBody>
+                    <a:bodyPr/>
+                    <a:lstStyle/>
+                    <a:p>
+                      <a:pPr algn="ctr"/>
+                      <a:r>
+                        <a:rPr lang="en-US" sz="1800" b="0" i="0" kern="1200" dirty="0" smtClean="0">
+                          <a:solidFill>
+                            <a:schemeClr val="dk1"/>
+                          </a:solidFill>
+                          <a:effectLst/>
+                          <a:latin typeface="+mn-lt"/>
+                          <a:ea typeface="+mn-ea"/>
+                          <a:cs typeface="+mn-cs"/>
+                        </a:rPr>
+                        <a:t>O6N6*</a:t>
+                      </a:r>
                       <a:endParaRPr lang="en-US" dirty="0"/>
                     </a:p>
                   </a:txBody>
@@ -8771,7 +9182,7 @@
           <a:p>
             <a:r>
               <a:rPr lang="sk-SK" smtClean="0"/>
-              <a:t>© 2017 EV3Lessons.com, Last edit 8/06/2017</a:t>
+              <a:t>© 2017 EV3Lessons.com, Last edit 8/07/2017</a:t>
             </a:r>
             <a:endParaRPr lang="en-US"/>
           </a:p>
@@ -8808,36 +9219,218 @@
           </a:p>
         </p:txBody>
       </p:sp>
+      <p:sp>
+        <p:nvSpPr>
+          <p:cNvPr id="9" name="Slide Number Placeholder 8"/>
+          <p:cNvSpPr>
+            <a:spLocks noGrp="1"/>
+          </p:cNvSpPr>
+          <p:nvPr>
+            <p:ph type="sldNum" sz="quarter" idx="12"/>
+          </p:nvPr>
+        </p:nvSpPr>
+        <p:spPr/>
+        <p:txBody>
+          <a:bodyPr/>
+          <a:lstStyle/>
+          <a:p>
+            <a:fld id="{4382A7F7-08BF-4252-8141-63FB96055BBB}" type="slidenum">
+              <a:rPr lang="en-US" smtClean="0"/>
+              <a:t>7</a:t>
+            </a:fld>
+            <a:endParaRPr lang="en-US"/>
+          </a:p>
+        </p:txBody>
+      </p:sp>
+      <p:sp>
+        <p:nvSpPr>
+          <p:cNvPr id="10" name="TextBox 9"/>
+          <p:cNvSpPr txBox="1"/>
+          <p:nvPr/>
+        </p:nvSpPr>
+        <p:spPr>
+          <a:xfrm>
+            <a:off x="7643997" y="4571288"/>
+            <a:ext cx="1122617" cy="430887"/>
+          </a:xfrm>
+          <a:prstGeom prst="rect">
+            <a:avLst/>
+          </a:prstGeom>
+          <a:noFill/>
+        </p:spPr>
+        <p:txBody>
+          <a:bodyPr wrap="square" rtlCol="0">
+            <a:spAutoFit/>
+          </a:bodyPr>
+          <a:lstStyle/>
+          <a:p>
+            <a:r>
+              <a:rPr lang="en-US" sz="1050" dirty="0" smtClean="0"/>
+              <a:t>Photo Credit: </a:t>
+            </a:r>
+            <a:endParaRPr lang="en-US" sz="1050" dirty="0" smtClean="0"/>
+          </a:p>
+          <a:p>
+            <a:r>
+              <a:rPr lang="en-US" sz="1050" dirty="0" smtClean="0"/>
+              <a:t>Thomas </a:t>
+            </a:r>
+            <a:r>
+              <a:rPr lang="en-US" sz="1050" dirty="0" err="1" smtClean="0"/>
+              <a:t>Madeya</a:t>
+            </a:r>
+            <a:endParaRPr lang="en-US" sz="1050" dirty="0"/>
+          </a:p>
+        </p:txBody>
+      </p:sp>
+      <p:sp>
+        <p:nvSpPr>
+          <p:cNvPr id="6" name="TextBox 5"/>
+          <p:cNvSpPr txBox="1"/>
+          <p:nvPr/>
+        </p:nvSpPr>
+        <p:spPr>
+          <a:xfrm>
+            <a:off x="7950781" y="4286452"/>
+            <a:ext cx="694267" cy="369332"/>
+          </a:xfrm>
+          <a:prstGeom prst="rect">
+            <a:avLst/>
+          </a:prstGeom>
+          <a:noFill/>
+        </p:spPr>
+        <p:txBody>
+          <a:bodyPr wrap="square" rtlCol="0">
+            <a:spAutoFit/>
+          </a:bodyPr>
+          <a:lstStyle/>
+          <a:p>
+            <a:r>
+              <a:rPr lang="en-US" smtClean="0"/>
+              <a:t>“N5”</a:t>
+            </a:r>
+            <a:endParaRPr lang="en-US"/>
+          </a:p>
+        </p:txBody>
+      </p:sp>
+      <p:sp>
+        <p:nvSpPr>
+          <p:cNvPr id="13" name="TextBox 12"/>
+          <p:cNvSpPr txBox="1"/>
+          <p:nvPr/>
+        </p:nvSpPr>
+        <p:spPr>
+          <a:xfrm>
+            <a:off x="5101932" y="4308978"/>
+            <a:ext cx="694267" cy="369332"/>
+          </a:xfrm>
+          <a:prstGeom prst="rect">
+            <a:avLst/>
+          </a:prstGeom>
+          <a:noFill/>
+        </p:spPr>
+        <p:txBody>
+          <a:bodyPr wrap="square" rtlCol="0">
+            <a:spAutoFit/>
+          </a:bodyPr>
+          <a:lstStyle/>
+          <a:p>
+            <a:r>
+              <a:rPr lang="en-US" dirty="0" smtClean="0"/>
+              <a:t>“N3”</a:t>
+            </a:r>
+            <a:endParaRPr lang="en-US" dirty="0"/>
+          </a:p>
+        </p:txBody>
+      </p:sp>
+      <p:sp>
+        <p:nvSpPr>
+          <p:cNvPr id="14" name="TextBox 13"/>
+          <p:cNvSpPr txBox="1"/>
+          <p:nvPr/>
+        </p:nvSpPr>
+        <p:spPr>
+          <a:xfrm>
+            <a:off x="6592846" y="4286452"/>
+            <a:ext cx="694267" cy="369332"/>
+          </a:xfrm>
+          <a:prstGeom prst="rect">
+            <a:avLst/>
+          </a:prstGeom>
+          <a:noFill/>
+        </p:spPr>
+        <p:txBody>
+          <a:bodyPr wrap="square" rtlCol="0">
+            <a:spAutoFit/>
+          </a:bodyPr>
+          <a:lstStyle/>
+          <a:p>
+            <a:r>
+              <a:rPr lang="en-US" dirty="0" smtClean="0"/>
+              <a:t>“N4”</a:t>
+            </a:r>
+            <a:endParaRPr lang="en-US" dirty="0"/>
+          </a:p>
+        </p:txBody>
+      </p:sp>
       <p:pic>
         <p:nvPicPr>
-          <p:cNvPr id="6" name="Picture 5"/>
+          <p:cNvPr id="15" name="Picture 14"/>
           <p:cNvPicPr>
             <a:picLocks noChangeAspect="1"/>
           </p:cNvPicPr>
           <p:nvPr/>
         </p:nvPicPr>
-        <p:blipFill>
-          <a:blip r:embed="rId2" cstate="print">
+        <p:blipFill rotWithShape="1">
+          <a:blip r:embed="rId3" cstate="print">
             <a:extLst>
               <a:ext uri="{28A0092B-C50C-407E-A947-70E740481C1C}">
                 <a14:useLocalDpi xmlns:a14="http://schemas.microsoft.com/office/drawing/2010/main"/>
               </a:ext>
             </a:extLst>
           </a:blip>
-          <a:stretch>
-            <a:fillRect/>
-          </a:stretch>
+          <a:srcRect/>
+          <a:stretch/>
         </p:blipFill>
         <p:spPr>
           <a:xfrm>
-            <a:off x="4824424" y="1818870"/>
-            <a:ext cx="4072597" cy="4072597"/>
+            <a:off x="6237900" y="2253587"/>
+            <a:ext cx="1245250" cy="2021035"/>
           </a:xfrm>
           <a:prstGeom prst="rect">
             <a:avLst/>
           </a:prstGeom>
         </p:spPr>
       </p:pic>
+      <p:pic>
+        <p:nvPicPr>
+          <p:cNvPr id="16" name="Picture 15"/>
+          <p:cNvPicPr>
+            <a:picLocks noChangeAspect="1"/>
+          </p:cNvPicPr>
+          <p:nvPr/>
+        </p:nvPicPr>
+        <p:blipFill rotWithShape="1">
+          <a:blip r:embed="rId4" cstate="print">
+            <a:extLst>
+              <a:ext uri="{28A0092B-C50C-407E-A947-70E740481C1C}">
+                <a14:useLocalDpi xmlns:a14="http://schemas.microsoft.com/office/drawing/2010/main"/>
+              </a:ext>
+            </a:extLst>
+          </a:blip>
+          <a:srcRect/>
+          <a:stretch/>
+        </p:blipFill>
+        <p:spPr>
+          <a:xfrm>
+            <a:off x="7592682" y="2233583"/>
+            <a:ext cx="1173932" cy="2045340"/>
+          </a:xfrm>
+          <a:prstGeom prst="rect">
+            <a:avLst/>
+          </a:prstGeom>
+        </p:spPr>
+      </p:pic>
       <p:sp>
         <p:nvSpPr>
           <p:cNvPr id="7" name="Oval 6"/>
@@ -8846,8 +9439,8 @@
         </p:nvSpPr>
         <p:spPr>
           <a:xfrm>
-            <a:off x="5528600" y="3207434"/>
-            <a:ext cx="914400" cy="689317"/>
+            <a:off x="7832514" y="2841012"/>
+            <a:ext cx="694267" cy="280360"/>
           </a:xfrm>
           <a:prstGeom prst="ellipse">
             <a:avLst/>
@@ -8880,14 +9473,14 @@
       </p:sp>
       <p:sp>
         <p:nvSpPr>
-          <p:cNvPr id="8" name="Oval 7"/>
+          <p:cNvPr id="17" name="Oval 16"/>
           <p:cNvSpPr/>
           <p:nvPr/>
         </p:nvSpPr>
         <p:spPr>
           <a:xfrm>
-            <a:off x="7221016" y="3207433"/>
-            <a:ext cx="914400" cy="689317"/>
+            <a:off x="6592845" y="2829700"/>
+            <a:ext cx="694267" cy="280360"/>
           </a:xfrm>
           <a:prstGeom prst="ellipse">
             <a:avLst/>
@@ -8918,26 +9511,102 @@
           </a:p>
         </p:txBody>
       </p:sp>
-      <p:sp>
-        <p:nvSpPr>
-          <p:cNvPr id="9" name="Slide Number Placeholder 8"/>
-          <p:cNvSpPr>
-            <a:spLocks noGrp="1"/>
-          </p:cNvSpPr>
-          <p:nvPr>
-            <p:ph type="sldNum" sz="quarter" idx="12"/>
-          </p:nvPr>
-        </p:nvSpPr>
-        <p:spPr/>
-        <p:txBody>
-          <a:bodyPr/>
-          <a:lstStyle/>
-          <a:p>
-            <a:fld id="{4382A7F7-08BF-4252-8141-63FB96055BBB}" type="slidenum">
-              <a:rPr lang="en-US" smtClean="0"/>
-              <a:t>7</a:t>
-            </a:fld>
+      <p:pic>
+        <p:nvPicPr>
+          <p:cNvPr id="18" name="Picture 17"/>
+          <p:cNvPicPr>
+            <a:picLocks noChangeAspect="1"/>
+          </p:cNvPicPr>
+          <p:nvPr/>
+        </p:nvPicPr>
+        <p:blipFill rotWithShape="1">
+          <a:blip r:embed="rId5" cstate="print">
+            <a:extLst>
+              <a:ext uri="{28A0092B-C50C-407E-A947-70E740481C1C}">
+                <a14:useLocalDpi xmlns:a14="http://schemas.microsoft.com/office/drawing/2010/main"/>
+              </a:ext>
+            </a:extLst>
+          </a:blip>
+          <a:srcRect/>
+          <a:stretch/>
+        </p:blipFill>
+        <p:spPr>
+          <a:xfrm>
+            <a:off x="4779096" y="2233582"/>
+            <a:ext cx="1339941" cy="2041039"/>
+          </a:xfrm>
+          <a:prstGeom prst="rect">
+            <a:avLst/>
+          </a:prstGeom>
+        </p:spPr>
+      </p:pic>
+      <p:sp>
+        <p:nvSpPr>
+          <p:cNvPr id="19" name="Oval 18"/>
+          <p:cNvSpPr/>
+          <p:nvPr/>
+        </p:nvSpPr>
+        <p:spPr>
+          <a:xfrm>
+            <a:off x="5161755" y="2807262"/>
+            <a:ext cx="694267" cy="280360"/>
+          </a:xfrm>
+          <a:prstGeom prst="ellipse">
+            <a:avLst/>
+          </a:prstGeom>
+          <a:noFill/>
+          <a:ln w="38100"/>
+        </p:spPr>
+        <p:style>
+          <a:lnRef idx="1">
+            <a:schemeClr val="accent1"/>
+          </a:lnRef>
+          <a:fillRef idx="3">
+            <a:schemeClr val="accent1"/>
+          </a:fillRef>
+          <a:effectRef idx="2">
+            <a:schemeClr val="accent1"/>
+          </a:effectRef>
+          <a:fontRef idx="minor">
+            <a:schemeClr val="lt1"/>
+          </a:fontRef>
+        </p:style>
+        <p:txBody>
+          <a:bodyPr rtlCol="0" anchor="ctr"/>
+          <a:lstStyle/>
+          <a:p>
+            <a:pPr algn="ctr"/>
             <a:endParaRPr lang="en-US"/>
+          </a:p>
+        </p:txBody>
+      </p:sp>
+      <p:sp>
+        <p:nvSpPr>
+          <p:cNvPr id="20" name="TextBox 19"/>
+          <p:cNvSpPr txBox="1"/>
+          <p:nvPr/>
+        </p:nvSpPr>
+        <p:spPr>
+          <a:xfrm>
+            <a:off x="4969565" y="5141843"/>
+            <a:ext cx="3675483" cy="369332"/>
+          </a:xfrm>
+          <a:prstGeom prst="rect">
+            <a:avLst/>
+          </a:prstGeom>
+          <a:noFill/>
+        </p:spPr>
+        <p:txBody>
+          <a:bodyPr wrap="square" rtlCol="0">
+            <a:spAutoFit/>
+          </a:bodyPr>
+          <a:lstStyle/>
+          <a:p>
+            <a:r>
+              <a:rPr lang="en-US" i="1" dirty="0" smtClean="0"/>
+              <a:t>See next slide for zoomed in versions</a:t>
+            </a:r>
+            <a:endParaRPr lang="en-US" i="1" dirty="0"/>
           </a:p>
         </p:txBody>
       </p:sp>
@@ -8951,6 +9620,13 @@
   <p:clrMapOvr>
     <a:masterClrMapping/>
   </p:clrMapOvr>
+  <p:timing>
+    <p:tnLst>
+      <p:par>
+        <p:cTn id="1" dur="indefinite" restart="never" nodeType="tmRoot"/>
+      </p:par>
+    </p:tnLst>
+  </p:timing>
 </p:sld>
 </file>
 
@@ -8973,7 +9649,53 @@
       </p:grpSpPr>
       <p:sp>
         <p:nvSpPr>
-          <p:cNvPr id="2" name="Title 1"/>
+          <p:cNvPr id="3" name="Footer Placeholder 2"/>
+          <p:cNvSpPr>
+            <a:spLocks noGrp="1"/>
+          </p:cNvSpPr>
+          <p:nvPr>
+            <p:ph type="ftr" sz="quarter" idx="11"/>
+          </p:nvPr>
+        </p:nvSpPr>
+        <p:spPr/>
+        <p:txBody>
+          <a:bodyPr/>
+          <a:lstStyle/>
+          <a:p>
+            <a:r>
+              <a:rPr lang="sk-SK" smtClean="0"/>
+              <a:t>© 2017 EV3Lessons.com, Last edit 8/07/2017</a:t>
+            </a:r>
+            <a:endParaRPr lang="en-US"/>
+          </a:p>
+        </p:txBody>
+      </p:sp>
+      <p:sp>
+        <p:nvSpPr>
+          <p:cNvPr id="4" name="Slide Number Placeholder 3"/>
+          <p:cNvSpPr>
+            <a:spLocks noGrp="1"/>
+          </p:cNvSpPr>
+          <p:nvPr>
+            <p:ph type="sldNum" sz="quarter" idx="12"/>
+          </p:nvPr>
+        </p:nvSpPr>
+        <p:spPr/>
+        <p:txBody>
+          <a:bodyPr/>
+          <a:lstStyle/>
+          <a:p>
+            <a:fld id="{4382A7F7-08BF-4252-8141-63FB96055BBB}" type="slidenum">
+              <a:rPr lang="en-US" smtClean="0"/>
+              <a:t>8</a:t>
+            </a:fld>
+            <a:endParaRPr lang="en-US"/>
+          </a:p>
+        </p:txBody>
+      </p:sp>
+      <p:sp>
+        <p:nvSpPr>
+          <p:cNvPr id="5" name="Title 4"/>
           <p:cNvSpPr>
             <a:spLocks noGrp="1"/>
           </p:cNvSpPr>
@@ -8988,246 +9710,109 @@
           <a:p>
             <a:r>
               <a:rPr lang="en-US" dirty="0" smtClean="0"/>
-              <a:t>What if </a:t>
-            </a:r>
-            <a:r>
-              <a:rPr lang="en-US" dirty="0"/>
-              <a:t>Y</a:t>
-            </a:r>
-            <a:r>
-              <a:rPr lang="en-US" dirty="0" smtClean="0"/>
-              <a:t>ou Own an “N4” Sensor?</a:t>
-            </a:r>
-            <a:r>
-              <a:rPr lang="en-US" baseline="30000" dirty="0" smtClean="0"/>
-              <a:t>*</a:t>
-            </a:r>
-            <a:endParaRPr lang="en-US" baseline="30000" dirty="0"/>
-          </a:p>
-        </p:txBody>
-      </p:sp>
-      <p:sp>
-        <p:nvSpPr>
-          <p:cNvPr id="3" name="Text Placeholder 2"/>
-          <p:cNvSpPr>
-            <a:spLocks noGrp="1"/>
-          </p:cNvSpPr>
-          <p:nvPr>
-            <p:ph type="body" idx="1"/>
-          </p:nvPr>
-        </p:nvSpPr>
+              <a:t>Close up View of the Numbers</a:t>
+            </a:r>
+            <a:endParaRPr lang="en-US" dirty="0"/>
+          </a:p>
+        </p:txBody>
+      </p:sp>
+      <p:pic>
+        <p:nvPicPr>
+          <p:cNvPr id="6" name="Picture 5"/>
+          <p:cNvPicPr>
+            <a:picLocks noChangeAspect="1"/>
+          </p:cNvPicPr>
+          <p:nvPr/>
+        </p:nvPicPr>
+        <p:blipFill rotWithShape="1">
+          <a:blip r:embed="rId3" cstate="print">
+            <a:extLst>
+              <a:ext uri="{28A0092B-C50C-407E-A947-70E740481C1C}">
+                <a14:useLocalDpi xmlns:a14="http://schemas.microsoft.com/office/drawing/2010/main"/>
+              </a:ext>
+            </a:extLst>
+          </a:blip>
+          <a:srcRect/>
+          <a:stretch/>
+        </p:blipFill>
         <p:spPr>
           <a:xfrm>
-            <a:off x="403412" y="1277947"/>
-            <a:ext cx="3931920" cy="833250"/>
+            <a:off x="3260633" y="1593125"/>
+            <a:ext cx="2735376" cy="4439502"/>
           </a:xfrm>
+          <a:prstGeom prst="rect">
+            <a:avLst/>
+          </a:prstGeom>
         </p:spPr>
-        <p:txBody>
-          <a:bodyPr/>
-          <a:lstStyle/>
-          <a:p>
-            <a:r>
-              <a:rPr lang="en-US" dirty="0" smtClean="0"/>
-              <a:t>Hardware Solution</a:t>
-            </a:r>
-            <a:endParaRPr lang="en-US" dirty="0"/>
-          </a:p>
-        </p:txBody>
-      </p:sp>
-      <p:sp>
-        <p:nvSpPr>
-          <p:cNvPr id="4" name="Content Placeholder 3"/>
-          <p:cNvSpPr>
-            <a:spLocks noGrp="1"/>
-          </p:cNvSpPr>
-          <p:nvPr>
-            <p:ph sz="half" idx="2"/>
-          </p:nvPr>
-        </p:nvSpPr>
+      </p:pic>
+      <p:pic>
+        <p:nvPicPr>
+          <p:cNvPr id="7" name="Picture 6"/>
+          <p:cNvPicPr>
+            <a:picLocks noChangeAspect="1"/>
+          </p:cNvPicPr>
+          <p:nvPr/>
+        </p:nvPicPr>
+        <p:blipFill rotWithShape="1">
+          <a:blip r:embed="rId4" cstate="print">
+            <a:extLst>
+              <a:ext uri="{28A0092B-C50C-407E-A947-70E740481C1C}">
+                <a14:useLocalDpi xmlns:a14="http://schemas.microsoft.com/office/drawing/2010/main"/>
+              </a:ext>
+            </a:extLst>
+          </a:blip>
+          <a:srcRect/>
+          <a:stretch/>
+        </p:blipFill>
         <p:spPr>
           <a:xfrm>
-            <a:off x="403412" y="2133609"/>
-            <a:ext cx="3931920" cy="2880852"/>
+            <a:off x="6324600" y="1573053"/>
+            <a:ext cx="2574791" cy="4486055"/>
           </a:xfrm>
+          <a:prstGeom prst="rect">
+            <a:avLst/>
+          </a:prstGeom>
         </p:spPr>
-        <p:txBody>
-          <a:bodyPr>
-            <a:normAutofit fontScale="92500" lnSpcReduction="10000"/>
-          </a:bodyPr>
-          <a:lstStyle/>
-          <a:p>
-            <a:r>
-              <a:rPr lang="en-US" dirty="0" smtClean="0"/>
-              <a:t>Unplug and re-plug your gyro sensor while making sure your robot is still</a:t>
-            </a:r>
-          </a:p>
-          <a:p>
-            <a:endParaRPr lang="en-US" dirty="0"/>
-          </a:p>
-          <a:p>
-            <a:r>
-              <a:rPr lang="en-US" dirty="0" smtClean="0">
-                <a:solidFill>
-                  <a:srgbClr val="FF0000"/>
-                </a:solidFill>
-              </a:rPr>
-              <a:t>This technique requires access to the EV3 ports and is prone to failure since you may shake the robot as you re-plug the wire.</a:t>
-            </a:r>
-            <a:endParaRPr lang="en-US" dirty="0">
-              <a:solidFill>
-                <a:srgbClr val="FF0000"/>
-              </a:solidFill>
-            </a:endParaRPr>
-          </a:p>
-        </p:txBody>
-      </p:sp>
-      <p:sp>
-        <p:nvSpPr>
-          <p:cNvPr id="5" name="Text Placeholder 4"/>
-          <p:cNvSpPr>
-            <a:spLocks noGrp="1"/>
-          </p:cNvSpPr>
-          <p:nvPr>
-            <p:ph type="body" sz="quarter" idx="3"/>
-          </p:nvPr>
-        </p:nvSpPr>
+      </p:pic>
+      <p:pic>
+        <p:nvPicPr>
+          <p:cNvPr id="8" name="Picture 7"/>
+          <p:cNvPicPr>
+            <a:picLocks noChangeAspect="1"/>
+          </p:cNvPicPr>
+          <p:nvPr/>
+        </p:nvPicPr>
+        <p:blipFill rotWithShape="1">
+          <a:blip r:embed="rId5" cstate="print">
+            <a:extLst>
+              <a:ext uri="{28A0092B-C50C-407E-A947-70E740481C1C}">
+                <a14:useLocalDpi xmlns:a14="http://schemas.microsoft.com/office/drawing/2010/main"/>
+              </a:ext>
+            </a:extLst>
+          </a:blip>
+          <a:srcRect/>
+          <a:stretch/>
+        </p:blipFill>
         <p:spPr>
           <a:xfrm>
-            <a:off x="4779495" y="1277947"/>
-            <a:ext cx="3931920" cy="833250"/>
+            <a:off x="293077" y="1582779"/>
+            <a:ext cx="2656626" cy="4449848"/>
           </a:xfrm>
+          <a:prstGeom prst="rect">
+            <a:avLst/>
+          </a:prstGeom>
         </p:spPr>
-        <p:txBody>
-          <a:bodyPr/>
-          <a:lstStyle/>
-          <a:p>
-            <a:r>
-              <a:rPr lang="en-US" dirty="0">
-                <a:solidFill>
-                  <a:schemeClr val="accent1"/>
-                </a:solidFill>
-              </a:rPr>
-              <a:t>Software Solution</a:t>
-            </a:r>
-            <a:endParaRPr lang="en-US" dirty="0">
-              <a:solidFill>
-                <a:schemeClr val="accent1"/>
-              </a:solidFill>
-            </a:endParaRPr>
-          </a:p>
-        </p:txBody>
-      </p:sp>
-      <p:sp>
-        <p:nvSpPr>
-          <p:cNvPr id="6" name="Content Placeholder 5"/>
-          <p:cNvSpPr>
-            <a:spLocks noGrp="1"/>
-          </p:cNvSpPr>
-          <p:nvPr>
-            <p:ph sz="quarter" idx="4"/>
-          </p:nvPr>
+      </p:pic>
+      <p:sp>
+        <p:nvSpPr>
+          <p:cNvPr id="9" name="TextBox 8"/>
+          <p:cNvSpPr txBox="1"/>
+          <p:nvPr/>
         </p:nvSpPr>
         <p:spPr>
           <a:xfrm>
-            <a:off x="4779495" y="2133608"/>
-            <a:ext cx="3931920" cy="4183380"/>
-          </a:xfrm>
-        </p:spPr>
-        <p:txBody>
-          <a:bodyPr>
-            <a:normAutofit fontScale="92500" lnSpcReduction="10000"/>
-          </a:bodyPr>
-          <a:lstStyle/>
-          <a:p>
-            <a:r>
-              <a:rPr lang="en-US" dirty="0"/>
-              <a:t>If you read the port the gyro is connected to as an infrared sensor and then read it again as a gyro sensor, it seems to force </a:t>
-            </a:r>
-            <a:r>
-              <a:rPr lang="en-US" dirty="0" smtClean="0"/>
-              <a:t>a recalibration </a:t>
-            </a:r>
-            <a:r>
-              <a:rPr lang="en-US" dirty="0"/>
-              <a:t>of the gyro. </a:t>
-            </a:r>
-            <a:endParaRPr lang="en-US" dirty="0" smtClean="0"/>
-          </a:p>
-          <a:p>
-            <a:r>
-              <a:rPr lang="en-US" dirty="0" smtClean="0"/>
-              <a:t>See the next 4 slides for updated recalibration code for the “N4” sensor. (Can be used with “N3” as well.)</a:t>
-            </a:r>
-          </a:p>
-          <a:p>
-            <a:r>
-              <a:rPr lang="en-US" dirty="0" smtClean="0">
-                <a:solidFill>
-                  <a:srgbClr val="FF0000"/>
-                </a:solidFill>
-              </a:rPr>
-              <a:t>Note: Did not work reading the sensor as color, ultrasonic, touch or temperature.</a:t>
-            </a:r>
-            <a:r>
-              <a:rPr lang="en-US" dirty="0"/>
-              <a:t/>
-            </a:r>
-            <a:br>
-              <a:rPr lang="en-US" dirty="0"/>
-            </a:br>
-            <a:endParaRPr lang="en-US" dirty="0"/>
-          </a:p>
-        </p:txBody>
-      </p:sp>
-      <p:sp>
-        <p:nvSpPr>
-          <p:cNvPr id="7" name="Footer Placeholder 6"/>
-          <p:cNvSpPr>
-            <a:spLocks noGrp="1"/>
-          </p:cNvSpPr>
-          <p:nvPr>
-            <p:ph type="ftr" sz="quarter" idx="11"/>
-          </p:nvPr>
-        </p:nvSpPr>
-        <p:spPr/>
-        <p:txBody>
-          <a:bodyPr/>
-          <a:lstStyle/>
-          <a:p>
-            <a:r>
-              <a:rPr lang="sk-SK" dirty="0" smtClean="0"/>
-              <a:t>© 2017 EV3Lessons.com, </a:t>
-            </a:r>
-            <a:r>
-              <a:rPr lang="sk-SK" dirty="0" err="1" smtClean="0"/>
-              <a:t>Last</a:t>
-            </a:r>
-            <a:r>
-              <a:rPr lang="sk-SK" dirty="0" smtClean="0"/>
-              <a:t> </a:t>
-            </a:r>
-            <a:r>
-              <a:rPr lang="sk-SK" dirty="0" err="1" smtClean="0"/>
-              <a:t>edit</a:t>
-            </a:r>
-            <a:r>
-              <a:rPr lang="sk-SK" dirty="0" smtClean="0"/>
-              <a:t> 8/06/2017</a:t>
-            </a:r>
-            <a:endParaRPr lang="en-US" dirty="0"/>
-          </a:p>
-        </p:txBody>
-      </p:sp>
-      <p:sp>
-        <p:nvSpPr>
-          <p:cNvPr id="8" name="TextBox 7"/>
-          <p:cNvSpPr txBox="1"/>
-          <p:nvPr/>
-        </p:nvSpPr>
-        <p:spPr>
-          <a:xfrm>
-            <a:off x="584508" y="6068322"/>
-            <a:ext cx="7713407" cy="369332"/>
+            <a:off x="6324599" y="5601740"/>
+            <a:ext cx="1122617" cy="430887"/>
           </a:xfrm>
           <a:prstGeom prst="rect">
             <a:avLst/>
@@ -9241,46 +9826,131 @@
           <a:lstStyle/>
           <a:p>
             <a:r>
-              <a:rPr lang="en-US" i="1" dirty="0" smtClean="0"/>
-              <a:t>* As we discover more solutions, this slide will be updated.</a:t>
-            </a:r>
-            <a:endParaRPr lang="en-US" i="1" dirty="0"/>
-          </a:p>
-        </p:txBody>
-      </p:sp>
-      <p:sp>
-        <p:nvSpPr>
-          <p:cNvPr id="9" name="Slide Number Placeholder 8"/>
-          <p:cNvSpPr>
-            <a:spLocks noGrp="1"/>
-          </p:cNvSpPr>
-          <p:nvPr>
-            <p:ph type="sldNum" sz="quarter" idx="12"/>
-          </p:nvPr>
-        </p:nvSpPr>
-        <p:spPr/>
-        <p:txBody>
-          <a:bodyPr/>
-          <a:lstStyle/>
-          <a:p>
-            <a:fld id="{4382A7F7-08BF-4252-8141-63FB96055BBB}" type="slidenum">
-              <a:rPr lang="en-US" smtClean="0"/>
-              <a:t>8</a:t>
-            </a:fld>
+              <a:rPr lang="en-US" sz="1050" dirty="0" smtClean="0"/>
+              <a:t>Photo Credit: </a:t>
+            </a:r>
+            <a:endParaRPr lang="en-US" sz="1050" dirty="0" smtClean="0"/>
+          </a:p>
+          <a:p>
+            <a:r>
+              <a:rPr lang="en-US" sz="1050" dirty="0" smtClean="0"/>
+              <a:t>Thomas </a:t>
+            </a:r>
+            <a:r>
+              <a:rPr lang="en-US" sz="1050" dirty="0" err="1" smtClean="0"/>
+              <a:t>Madeya</a:t>
+            </a:r>
+            <a:endParaRPr lang="en-US" sz="1050" dirty="0"/>
+          </a:p>
+        </p:txBody>
+      </p:sp>
+      <p:sp>
+        <p:nvSpPr>
+          <p:cNvPr id="10" name="TextBox 9"/>
+          <p:cNvSpPr txBox="1"/>
+          <p:nvPr/>
+        </p:nvSpPr>
+        <p:spPr>
+          <a:xfrm>
+            <a:off x="7197612" y="4201956"/>
+            <a:ext cx="694267" cy="369332"/>
+          </a:xfrm>
+          <a:prstGeom prst="rect">
+            <a:avLst/>
+          </a:prstGeom>
+          <a:noFill/>
+        </p:spPr>
+        <p:txBody>
+          <a:bodyPr wrap="square" rtlCol="0">
+            <a:spAutoFit/>
+          </a:bodyPr>
+          <a:lstStyle/>
+          <a:p>
+            <a:r>
+              <a:rPr lang="en-US" smtClean="0"/>
+              <a:t>“N5”</a:t>
+            </a:r>
             <a:endParaRPr lang="en-US"/>
+          </a:p>
+        </p:txBody>
+      </p:sp>
+      <p:sp>
+        <p:nvSpPr>
+          <p:cNvPr id="11" name="TextBox 10"/>
+          <p:cNvSpPr txBox="1"/>
+          <p:nvPr/>
+        </p:nvSpPr>
+        <p:spPr>
+          <a:xfrm>
+            <a:off x="1523845" y="4179723"/>
+            <a:ext cx="694267" cy="369332"/>
+          </a:xfrm>
+          <a:prstGeom prst="rect">
+            <a:avLst/>
+          </a:prstGeom>
+          <a:noFill/>
+        </p:spPr>
+        <p:txBody>
+          <a:bodyPr wrap="square" rtlCol="0">
+            <a:spAutoFit/>
+          </a:bodyPr>
+          <a:lstStyle/>
+          <a:p>
+            <a:r>
+              <a:rPr lang="en-US" dirty="0" smtClean="0"/>
+              <a:t>“N3”</a:t>
+            </a:r>
+            <a:endParaRPr lang="en-US" dirty="0"/>
+          </a:p>
+        </p:txBody>
+      </p:sp>
+      <p:sp>
+        <p:nvSpPr>
+          <p:cNvPr id="12" name="TextBox 11"/>
+          <p:cNvSpPr txBox="1"/>
+          <p:nvPr/>
+        </p:nvSpPr>
+        <p:spPr>
+          <a:xfrm>
+            <a:off x="4542926" y="4208965"/>
+            <a:ext cx="694267" cy="369332"/>
+          </a:xfrm>
+          <a:prstGeom prst="rect">
+            <a:avLst/>
+          </a:prstGeom>
+          <a:noFill/>
+        </p:spPr>
+        <p:txBody>
+          <a:bodyPr wrap="square" rtlCol="0">
+            <a:spAutoFit/>
+          </a:bodyPr>
+          <a:lstStyle/>
+          <a:p>
+            <a:r>
+              <a:rPr lang="en-US" dirty="0" smtClean="0"/>
+              <a:t>“N4”</a:t>
+            </a:r>
+            <a:endParaRPr lang="en-US" dirty="0"/>
           </a:p>
         </p:txBody>
       </p:sp>
     </p:spTree>
     <p:extLst>
       <p:ext uri="{BB962C8B-B14F-4D97-AF65-F5344CB8AC3E}">
-        <p14:creationId xmlns:p14="http://schemas.microsoft.com/office/powerpoint/2010/main" val="513848499"/>
+        <p14:creationId xmlns:p14="http://schemas.microsoft.com/office/powerpoint/2010/main" val="1405345240"/>
       </p:ext>
     </p:extLst>
   </p:cSld>
   <p:clrMapOvr>
     <a:masterClrMapping/>
   </p:clrMapOvr>
+  <p:timing>
+    <p:tnLst>
+      <p:par>
+        <p:cTn id="1" dur="indefinite" restart="never" nodeType="tmRoot"/>
+      </p:par>
+    </p:tnLst>
+  </p:timing>
 </p:sld>
 </file>
 
@@ -9303,7 +9973,212 @@
       </p:grpSpPr>
       <p:sp>
         <p:nvSpPr>
-          <p:cNvPr id="3" name="Footer Placeholder 2"/>
+          <p:cNvPr id="2" name="Title 1"/>
+          <p:cNvSpPr>
+            <a:spLocks noGrp="1"/>
+          </p:cNvSpPr>
+          <p:nvPr>
+            <p:ph type="title"/>
+          </p:nvPr>
+        </p:nvSpPr>
+        <p:spPr/>
+        <p:txBody>
+          <a:bodyPr>
+            <a:normAutofit fontScale="90000"/>
+          </a:bodyPr>
+          <a:lstStyle/>
+          <a:p>
+            <a:r>
+              <a:rPr lang="en-US" dirty="0" smtClean="0"/>
+              <a:t>What if </a:t>
+            </a:r>
+            <a:r>
+              <a:rPr lang="en-US" dirty="0"/>
+              <a:t>Y</a:t>
+            </a:r>
+            <a:r>
+              <a:rPr lang="en-US" dirty="0" smtClean="0"/>
+              <a:t>ou Own an “N4” or up Sensor?</a:t>
+            </a:r>
+            <a:r>
+              <a:rPr lang="en-US" baseline="30000" dirty="0" smtClean="0"/>
+              <a:t>*</a:t>
+            </a:r>
+            <a:endParaRPr lang="en-US" baseline="30000" dirty="0"/>
+          </a:p>
+        </p:txBody>
+      </p:sp>
+      <p:sp>
+        <p:nvSpPr>
+          <p:cNvPr id="3" name="Text Placeholder 2"/>
+          <p:cNvSpPr>
+            <a:spLocks noGrp="1"/>
+          </p:cNvSpPr>
+          <p:nvPr>
+            <p:ph type="body" idx="1"/>
+          </p:nvPr>
+        </p:nvSpPr>
+        <p:spPr>
+          <a:xfrm>
+            <a:off x="403412" y="1277947"/>
+            <a:ext cx="3931920" cy="833250"/>
+          </a:xfrm>
+        </p:spPr>
+        <p:txBody>
+          <a:bodyPr/>
+          <a:lstStyle/>
+          <a:p>
+            <a:r>
+              <a:rPr lang="en-US" dirty="0" smtClean="0"/>
+              <a:t>Hardware Solution</a:t>
+            </a:r>
+            <a:endParaRPr lang="en-US" dirty="0"/>
+          </a:p>
+        </p:txBody>
+      </p:sp>
+      <p:sp>
+        <p:nvSpPr>
+          <p:cNvPr id="4" name="Content Placeholder 3"/>
+          <p:cNvSpPr>
+            <a:spLocks noGrp="1"/>
+          </p:cNvSpPr>
+          <p:nvPr>
+            <p:ph sz="half" idx="2"/>
+          </p:nvPr>
+        </p:nvSpPr>
+        <p:spPr>
+          <a:xfrm>
+            <a:off x="403412" y="2133609"/>
+            <a:ext cx="3931920" cy="2880852"/>
+          </a:xfrm>
+        </p:spPr>
+        <p:txBody>
+          <a:bodyPr>
+            <a:normAutofit fontScale="92500" lnSpcReduction="10000"/>
+          </a:bodyPr>
+          <a:lstStyle/>
+          <a:p>
+            <a:r>
+              <a:rPr lang="en-US" dirty="0" smtClean="0"/>
+              <a:t>Unplug and re-plug your gyro sensor while making sure your robot is still</a:t>
+            </a:r>
+          </a:p>
+          <a:p>
+            <a:endParaRPr lang="en-US" dirty="0"/>
+          </a:p>
+          <a:p>
+            <a:r>
+              <a:rPr lang="en-US" dirty="0" smtClean="0">
+                <a:solidFill>
+                  <a:srgbClr val="FF0000"/>
+                </a:solidFill>
+              </a:rPr>
+              <a:t>This technique requires access to the EV3 ports and is prone to failure since you may shake the robot as you re-plug the wire.</a:t>
+            </a:r>
+            <a:endParaRPr lang="en-US" dirty="0">
+              <a:solidFill>
+                <a:srgbClr val="FF0000"/>
+              </a:solidFill>
+            </a:endParaRPr>
+          </a:p>
+        </p:txBody>
+      </p:sp>
+      <p:sp>
+        <p:nvSpPr>
+          <p:cNvPr id="5" name="Text Placeholder 4"/>
+          <p:cNvSpPr>
+            <a:spLocks noGrp="1"/>
+          </p:cNvSpPr>
+          <p:nvPr>
+            <p:ph type="body" sz="quarter" idx="3"/>
+          </p:nvPr>
+        </p:nvSpPr>
+        <p:spPr>
+          <a:xfrm>
+            <a:off x="4779495" y="1277947"/>
+            <a:ext cx="3931920" cy="833250"/>
+          </a:xfrm>
+        </p:spPr>
+        <p:txBody>
+          <a:bodyPr/>
+          <a:lstStyle/>
+          <a:p>
+            <a:r>
+              <a:rPr lang="en-US" dirty="0">
+                <a:solidFill>
+                  <a:schemeClr val="accent1"/>
+                </a:solidFill>
+              </a:rPr>
+              <a:t>Software Solution</a:t>
+            </a:r>
+          </a:p>
+        </p:txBody>
+      </p:sp>
+      <p:sp>
+        <p:nvSpPr>
+          <p:cNvPr id="6" name="Content Placeholder 5"/>
+          <p:cNvSpPr>
+            <a:spLocks noGrp="1"/>
+          </p:cNvSpPr>
+          <p:nvPr>
+            <p:ph sz="quarter" idx="4"/>
+          </p:nvPr>
+        </p:nvSpPr>
+        <p:spPr>
+          <a:xfrm>
+            <a:off x="4779495" y="2133608"/>
+            <a:ext cx="3931920" cy="4183380"/>
+          </a:xfrm>
+        </p:spPr>
+        <p:txBody>
+          <a:bodyPr>
+            <a:normAutofit fontScale="92500" lnSpcReduction="10000"/>
+          </a:bodyPr>
+          <a:lstStyle/>
+          <a:p>
+            <a:r>
+              <a:rPr lang="en-US" dirty="0"/>
+              <a:t>If you read the port the gyro is connected to as an infrared sensor and then read it again as a gyro sensor, it seems to force </a:t>
+            </a:r>
+            <a:r>
+              <a:rPr lang="en-US" dirty="0" smtClean="0"/>
+              <a:t>a recalibration </a:t>
+            </a:r>
+            <a:r>
+              <a:rPr lang="en-US" dirty="0"/>
+              <a:t>of the gyro. </a:t>
+            </a:r>
+            <a:endParaRPr lang="en-US" dirty="0" smtClean="0"/>
+          </a:p>
+          <a:p>
+            <a:r>
+              <a:rPr lang="en-US" dirty="0" smtClean="0"/>
+              <a:t>See the next 4 slides for updated recalibration code for the “N4” sensor. (Can be used with “N3” as well.)</a:t>
+            </a:r>
+          </a:p>
+          <a:p>
+            <a:r>
+              <a:rPr lang="en-US" dirty="0" smtClean="0">
+                <a:solidFill>
+                  <a:srgbClr val="FF0000"/>
+                </a:solidFill>
+              </a:rPr>
+              <a:t>Note: Did not work reading the sensor as color, ultrasonic, touch or temperature.</a:t>
+            </a:r>
+            <a:r>
+              <a:rPr lang="en-US" dirty="0"/>
+              <a:t/>
+            </a:r>
+            <a:br>
+              <a:rPr lang="en-US" dirty="0"/>
+            </a:br>
+            <a:endParaRPr lang="en-US" dirty="0"/>
+          </a:p>
+        </p:txBody>
+      </p:sp>
+      <p:sp>
+        <p:nvSpPr>
+          <p:cNvPr id="7" name="Footer Placeholder 6"/>
           <p:cNvSpPr>
             <a:spLocks noGrp="1"/>
           </p:cNvSpPr>
@@ -9317,24 +10192,8 @@
           <a:lstStyle/>
           <a:p>
             <a:r>
-              <a:rPr lang="sk-SK" dirty="0" smtClean="0"/>
-              <a:t>© 2017 EV3Lessons.com, </a:t>
-            </a:r>
-            <a:r>
-              <a:rPr lang="sk-SK" dirty="0" err="1" smtClean="0"/>
-              <a:t>Last</a:t>
-            </a:r>
-            <a:r>
-              <a:rPr lang="sk-SK" dirty="0" smtClean="0"/>
-              <a:t> </a:t>
-            </a:r>
-            <a:r>
-              <a:rPr lang="sk-SK" dirty="0" err="1" smtClean="0"/>
-              <a:t>edit</a:t>
-            </a:r>
-            <a:r>
-              <a:rPr lang="sk-SK" dirty="0" smtClean="0"/>
-              <a:t> 8/06/2017</a:t>
+              <a:rPr lang="sk-SK" smtClean="0"/>
+              <a:t>© 2017 EV3Lessons.com, Last edit 8/07/2017</a:t>
             </a:r>
             <a:endParaRPr lang="en-US" dirty="0"/>
           </a:p>
@@ -9342,70 +10201,19 @@
       </p:sp>
       <p:sp>
         <p:nvSpPr>
-          <p:cNvPr id="4" name="Title 3"/>
-          <p:cNvSpPr>
-            <a:spLocks noGrp="1"/>
-          </p:cNvSpPr>
-          <p:nvPr>
-            <p:ph type="title"/>
-          </p:nvPr>
-        </p:nvSpPr>
-        <p:spPr/>
-        <p:txBody>
-          <a:bodyPr/>
-          <a:lstStyle/>
-          <a:p>
-            <a:r>
-              <a:rPr lang="en-US" dirty="0" smtClean="0"/>
-              <a:t>Recalibration Strategy 5</a:t>
-            </a:r>
-            <a:endParaRPr lang="en-US" dirty="0"/>
-          </a:p>
-        </p:txBody>
-      </p:sp>
-      <p:sp>
-        <p:nvSpPr>
-          <p:cNvPr id="5" name="Slide Number Placeholder 4"/>
-          <p:cNvSpPr>
-            <a:spLocks noGrp="1"/>
-          </p:cNvSpPr>
-          <p:nvPr>
-            <p:ph type="sldNum" sz="quarter" idx="12"/>
-          </p:nvPr>
-        </p:nvSpPr>
-        <p:spPr/>
-        <p:txBody>
-          <a:bodyPr/>
-          <a:lstStyle/>
-          <a:p>
-            <a:fld id="{4382A7F7-08BF-4252-8141-63FB96055BBB}" type="slidenum">
-              <a:rPr lang="en-US" smtClean="0"/>
-              <a:t>9</a:t>
-            </a:fld>
-            <a:endParaRPr lang="en-US"/>
-          </a:p>
-        </p:txBody>
-      </p:sp>
-      <p:sp>
-        <p:nvSpPr>
-          <p:cNvPr id="6" name="TextBox 5"/>
+          <p:cNvPr id="8" name="TextBox 7"/>
           <p:cNvSpPr txBox="1"/>
           <p:nvPr/>
         </p:nvSpPr>
         <p:spPr>
           <a:xfrm>
-            <a:off x="416027" y="1689453"/>
-            <a:ext cx="4008489" cy="923330"/>
+            <a:off x="584508" y="6068322"/>
+            <a:ext cx="7713407" cy="369332"/>
           </a:xfrm>
           <a:prstGeom prst="rect">
             <a:avLst/>
           </a:prstGeom>
-          <a:solidFill>
-            <a:schemeClr val="accent2">
-              <a:lumMod val="60000"/>
-              <a:lumOff val="40000"/>
-            </a:schemeClr>
-          </a:solidFill>
+          <a:noFill/>
         </p:spPr>
         <p:txBody>
           <a:bodyPr wrap="square" rtlCol="0">
@@ -9414,258 +10222,53 @@
           <a:lstStyle/>
           <a:p>
             <a:r>
-              <a:rPr lang="en-US" dirty="0" smtClean="0">
-                <a:solidFill>
-                  <a:srgbClr val="000000"/>
-                </a:solidFill>
-              </a:rPr>
-              <a:t>First, reading th</a:t>
-            </a:r>
-            <a:r>
-              <a:rPr lang="en-US" dirty="0" smtClean="0">
-                <a:solidFill>
-                  <a:srgbClr val="000000"/>
-                </a:solidFill>
-              </a:rPr>
-              <a:t>e gyro as an IR sensor and then as a gyro causes </a:t>
-            </a:r>
-            <a:r>
-              <a:rPr lang="en-US" dirty="0">
-                <a:solidFill>
-                  <a:srgbClr val="000000"/>
-                </a:solidFill>
-              </a:rPr>
-              <a:t>t</a:t>
-            </a:r>
-            <a:r>
-              <a:rPr lang="en-US" dirty="0" smtClean="0">
-                <a:solidFill>
-                  <a:srgbClr val="000000"/>
-                </a:solidFill>
-              </a:rPr>
-              <a:t>he </a:t>
-            </a:r>
-            <a:r>
-              <a:rPr lang="en-US" dirty="0" smtClean="0">
-                <a:solidFill>
-                  <a:srgbClr val="000000"/>
-                </a:solidFill>
-              </a:rPr>
-              <a:t>gyro </a:t>
-            </a:r>
-            <a:r>
-              <a:rPr lang="en-US" dirty="0" smtClean="0">
-                <a:solidFill>
-                  <a:srgbClr val="000000"/>
-                </a:solidFill>
-              </a:rPr>
-              <a:t>to recalibrate. </a:t>
-            </a:r>
-            <a:endParaRPr lang="en-US" dirty="0">
-              <a:solidFill>
-                <a:srgbClr val="000000"/>
-              </a:solidFill>
-            </a:endParaRPr>
-          </a:p>
-        </p:txBody>
-      </p:sp>
-      <p:sp>
-        <p:nvSpPr>
-          <p:cNvPr id="7" name="TextBox 6"/>
-          <p:cNvSpPr txBox="1"/>
-          <p:nvPr/>
-        </p:nvSpPr>
-        <p:spPr>
-          <a:xfrm>
-            <a:off x="4527755" y="1702380"/>
-            <a:ext cx="4330494" cy="1477328"/>
-          </a:xfrm>
-          <a:prstGeom prst="rect">
-            <a:avLst/>
-          </a:prstGeom>
-          <a:solidFill>
-            <a:schemeClr val="accent4">
-              <a:lumMod val="60000"/>
-              <a:lumOff val="40000"/>
-            </a:schemeClr>
-          </a:solidFill>
-        </p:spPr>
-        <p:txBody>
-          <a:bodyPr wrap="square" rtlCol="0">
-            <a:spAutoFit/>
-          </a:bodyPr>
-          <a:lstStyle/>
-          <a:p>
-            <a:r>
-              <a:rPr lang="en-US" dirty="0" smtClean="0">
-                <a:solidFill>
-                  <a:srgbClr val="3366FF"/>
-                </a:solidFill>
-              </a:rPr>
-              <a:t>Second, add a wait block to give the sensor a bit of time to fully </a:t>
-            </a:r>
-            <a:r>
-              <a:rPr lang="en-US" dirty="0" smtClean="0">
-                <a:solidFill>
-                  <a:srgbClr val="3366FF"/>
-                </a:solidFill>
-              </a:rPr>
-              <a:t>recalibrate. </a:t>
-            </a:r>
-            <a:r>
-              <a:rPr lang="en-US" dirty="0" smtClean="0">
-                <a:solidFill>
-                  <a:srgbClr val="3366FF"/>
-                </a:solidFill>
-              </a:rPr>
-              <a:t>Our measurements show that </a:t>
-            </a:r>
-            <a:r>
-              <a:rPr lang="en-US" dirty="0">
-                <a:solidFill>
-                  <a:srgbClr val="3366FF"/>
-                </a:solidFill>
-              </a:rPr>
-              <a:t>4</a:t>
-            </a:r>
-            <a:r>
-              <a:rPr lang="en-US" dirty="0" smtClean="0">
-                <a:solidFill>
-                  <a:srgbClr val="3366FF"/>
-                </a:solidFill>
-              </a:rPr>
-              <a:t> </a:t>
-            </a:r>
-            <a:r>
-              <a:rPr lang="en-US" dirty="0" smtClean="0">
-                <a:solidFill>
-                  <a:srgbClr val="3366FF"/>
-                </a:solidFill>
-              </a:rPr>
-              <a:t>seconds is </a:t>
-            </a:r>
-            <a:r>
-              <a:rPr lang="en-US" dirty="0" smtClean="0">
-                <a:solidFill>
-                  <a:srgbClr val="3366FF"/>
-                </a:solidFill>
-              </a:rPr>
-              <a:t>safe. Note that the Strategy 1 code in Intro to Gyro, recalibration only took 0.1 seconds.</a:t>
-            </a:r>
-            <a:endParaRPr lang="en-US" dirty="0">
-              <a:solidFill>
-                <a:srgbClr val="3366FF"/>
-              </a:solidFill>
-            </a:endParaRPr>
-          </a:p>
-        </p:txBody>
-      </p:sp>
-      <p:sp>
-        <p:nvSpPr>
-          <p:cNvPr id="8" name="TextBox 7"/>
-          <p:cNvSpPr txBox="1"/>
-          <p:nvPr/>
-        </p:nvSpPr>
-        <p:spPr>
-          <a:xfrm>
-            <a:off x="5884606" y="3543337"/>
-            <a:ext cx="2973643" cy="3139321"/>
-          </a:xfrm>
-          <a:prstGeom prst="rect">
-            <a:avLst/>
-          </a:prstGeom>
-          <a:solidFill>
-            <a:schemeClr val="accent1">
-              <a:lumMod val="40000"/>
-              <a:lumOff val="60000"/>
-            </a:schemeClr>
-          </a:solidFill>
-        </p:spPr>
-        <p:txBody>
-          <a:bodyPr wrap="square" rtlCol="0">
-            <a:spAutoFit/>
-          </a:bodyPr>
-          <a:lstStyle/>
-          <a:p>
-            <a:r>
-              <a:rPr lang="en-US" dirty="0" smtClean="0">
-                <a:solidFill>
-                  <a:srgbClr val="3366FF"/>
-                </a:solidFill>
-              </a:rPr>
-              <a:t>Note </a:t>
-            </a:r>
-            <a:r>
-              <a:rPr lang="en-US" dirty="0" smtClean="0">
-                <a:solidFill>
-                  <a:srgbClr val="3366FF"/>
-                </a:solidFill>
-              </a:rPr>
-              <a:t>for “N3” sensor users: in </a:t>
-            </a:r>
-            <a:r>
-              <a:rPr lang="en-US" dirty="0" smtClean="0">
-                <a:solidFill>
-                  <a:srgbClr val="3366FF"/>
-                </a:solidFill>
-              </a:rPr>
-              <a:t>the rest of your program, you should only use the “angle” modes of the gyro. Using the “rate” or “rate and angle” mode will cause the gyro to recalibrate. </a:t>
-            </a:r>
-            <a:r>
-              <a:rPr lang="en-US" dirty="0" smtClean="0">
-                <a:solidFill>
-                  <a:srgbClr val="3366FF"/>
-                </a:solidFill>
-              </a:rPr>
-              <a:t>“N4” sensor users can change modes without causing a recalibration. Mode changes do “reset” the angle to 0.</a:t>
-            </a:r>
-            <a:endParaRPr lang="en-US" dirty="0">
-              <a:solidFill>
-                <a:srgbClr val="3366FF"/>
-              </a:solidFill>
-            </a:endParaRPr>
-          </a:p>
-        </p:txBody>
-      </p:sp>
-      <p:pic>
-        <p:nvPicPr>
-          <p:cNvPr id="11" name="Picture 10"/>
-          <p:cNvPicPr>
-            <a:picLocks noChangeAspect="1"/>
-          </p:cNvPicPr>
-          <p:nvPr/>
-        </p:nvPicPr>
-        <p:blipFill rotWithShape="1">
-          <a:blip r:embed="rId2" cstate="print">
-            <a:extLst>
-              <a:ext uri="{28A0092B-C50C-407E-A947-70E740481C1C}">
-                <a14:useLocalDpi xmlns:a14="http://schemas.microsoft.com/office/drawing/2010/main"/>
-              </a:ext>
-            </a:extLst>
-          </a:blip>
-          <a:srcRect/>
-          <a:stretch/>
-        </p:blipFill>
-        <p:spPr>
-          <a:xfrm>
-            <a:off x="638830" y="3543337"/>
-            <a:ext cx="5175489" cy="2530066"/>
-          </a:xfrm>
-          <a:prstGeom prst="rect">
-            <a:avLst/>
-          </a:prstGeom>
-        </p:spPr>
-      </p:pic>
+              <a:rPr lang="en-US" i="1" dirty="0" smtClean="0"/>
+              <a:t>* As we discover more solutions, this slide will be updated.</a:t>
+            </a:r>
+            <a:endParaRPr lang="en-US" i="1" dirty="0"/>
+          </a:p>
+        </p:txBody>
+      </p:sp>
+      <p:sp>
+        <p:nvSpPr>
+          <p:cNvPr id="9" name="Slide Number Placeholder 8"/>
+          <p:cNvSpPr>
+            <a:spLocks noGrp="1"/>
+          </p:cNvSpPr>
+          <p:nvPr>
+            <p:ph type="sldNum" sz="quarter" idx="12"/>
+          </p:nvPr>
+        </p:nvSpPr>
+        <p:spPr/>
+        <p:txBody>
+          <a:bodyPr/>
+          <a:lstStyle/>
+          <a:p>
+            <a:fld id="{4382A7F7-08BF-4252-8141-63FB96055BBB}" type="slidenum">
+              <a:rPr lang="en-US" smtClean="0"/>
+              <a:t>9</a:t>
+            </a:fld>
+            <a:endParaRPr lang="en-US"/>
+          </a:p>
+        </p:txBody>
+      </p:sp>
     </p:spTree>
     <p:extLst>
       <p:ext uri="{BB962C8B-B14F-4D97-AF65-F5344CB8AC3E}">
-        <p14:creationId xmlns:p14="http://schemas.microsoft.com/office/powerpoint/2010/main" val="23065229"/>
+        <p14:creationId xmlns:p14="http://schemas.microsoft.com/office/powerpoint/2010/main" val="513848499"/>
       </p:ext>
     </p:extLst>
   </p:cSld>
   <p:clrMapOvr>
     <a:masterClrMapping/>
   </p:clrMapOvr>
+  <p:timing>
+    <p:tnLst>
+      <p:par>
+        <p:cTn id="1" dur="indefinite" restart="never" nodeType="tmRoot"/>
+      </p:par>
+    </p:tnLst>
+  </p:timing>
 </p:sld>
 </file>
 

</xml_diff>